<commit_message>
Adding data and charts
</commit_message>
<xml_diff>
--- a/presentation/chess_presentation.pptx
+++ b/presentation/chess_presentation.pptx
@@ -20,6 +20,17 @@
     <p:sldId id="265" r:id="rId15"/>
     <p:sldId id="266" r:id="rId16"/>
     <p:sldId id="267" r:id="rId17"/>
+    <p:sldId id="268" r:id="rId18"/>
+    <p:sldId id="269" r:id="rId19"/>
+    <p:sldId id="270" r:id="rId20"/>
+    <p:sldId id="271" r:id="rId21"/>
+    <p:sldId id="272" r:id="rId22"/>
+    <p:sldId id="273" r:id="rId23"/>
+    <p:sldId id="274" r:id="rId24"/>
+    <p:sldId id="275" r:id="rId25"/>
+    <p:sldId id="276" r:id="rId26"/>
+    <p:sldId id="277" r:id="rId27"/>
+    <p:sldId id="278" r:id="rId28"/>
   </p:sldIdLst>
   <p:sldSz cx="9144000" cy="6858000"/>
   <p:notesSz cx="7772400" cy="10058400"/>
@@ -4494,8 +4505,8 @@
         </p:nvSpPr>
         <p:spPr>
           <a:xfrm>
-            <a:off x="448920" y="833040"/>
-            <a:ext cx="8228880" cy="1142640"/>
+            <a:off x="457200" y="273600"/>
+            <a:ext cx="8228880" cy="1144800"/>
           </a:xfrm>
           <a:prstGeom prst="rect">
             <a:avLst/>
@@ -4504,6 +4515,11 @@
         <p:txBody>
           <a:bodyPr anchor="ctr" bIns="0" lIns="0" rIns="0" tIns="0" wrap="none"/>
           <a:p>
+            <a:pPr algn="ctr">
+              <a:lnSpc>
+                <a:spcPct val="100000"/>
+              </a:lnSpc>
+            </a:pPr>
             <a:r>
               <a:rPr lang="en-US"/>
               <a:t>Click to edit the title text format</a:t>
@@ -4525,7 +4541,7 @@
         <p:spPr>
           <a:xfrm>
             <a:off x="457200" y="1604520"/>
-            <a:ext cx="8046360" cy="3977280"/>
+            <a:ext cx="8046000" cy="3976920"/>
           </a:xfrm>
           <a:prstGeom prst="rect">
             <a:avLst/>
@@ -4534,11 +4550,6 @@
         <p:txBody>
           <a:bodyPr bIns="0" lIns="0" rIns="0" tIns="0" wrap="none"/>
           <a:p>
-            <a:pPr>
-              <a:buSzPct val="45000"/>
-              <a:buFont typeface="StarSymbol"/>
-              <a:buChar char=""/>
-            </a:pPr>
             <a:r>
               <a:rPr lang="en-US"/>
               <a:t>Click to edit the outline text format</a:t>
@@ -5218,7 +5229,7 @@
         <p:spPr>
           <a:xfrm>
             <a:off x="464400" y="4956120"/>
-            <a:ext cx="7771680" cy="996120"/>
+            <a:ext cx="7771320" cy="995760"/>
           </a:xfrm>
           <a:prstGeom prst="rect">
             <a:avLst/>
@@ -5235,7 +5246,7 @@
             <a:r>
               <a:rPr lang="en-US" sz="3600">
                 <a:solidFill>
-                  <a:srgbClr val="ffecbd"/>
+                  <a:srgbClr val="000000"/>
                 </a:solidFill>
                 <a:latin typeface="Calibri"/>
               </a:rPr>
@@ -5253,8 +5264,8 @@
         </p:nvSpPr>
         <p:spPr>
           <a:xfrm>
-            <a:off x="464400" y="5800320"/>
-            <a:ext cx="6400080" cy="834840"/>
+            <a:off x="91440" y="5932080"/>
+            <a:ext cx="6399720" cy="834480"/>
           </a:xfrm>
           <a:prstGeom prst="rect">
             <a:avLst/>
@@ -5269,13 +5280,30 @@
               </a:lnSpc>
             </a:pPr>
             <a:r>
-              <a:rPr lang="en-US" sz="2800">
+              <a:rPr lang="en-US" sz="2200">
                 <a:solidFill>
-                  <a:srgbClr val="bfbfbf"/>
+                  <a:srgbClr val="000000"/>
                 </a:solidFill>
                 <a:latin typeface="Calibri"/>
               </a:rPr>
-              <a:t>Niv Mizrahi, Tom Ron</a:t>
+              <a:t>Niv Mizrahi, </a:t>
+            </a:r>
+            <a:endParaRPr/>
+          </a:p>
+          <a:p>
+            <a:pPr>
+              <a:lnSpc>
+                <a:spcPct val="100000"/>
+              </a:lnSpc>
+            </a:pPr>
+            <a:r>
+              <a:rPr lang="en-US" sz="2200">
+                <a:solidFill>
+                  <a:srgbClr val="000000"/>
+                </a:solidFill>
+                <a:latin typeface="Calibri"/>
+              </a:rPr>
+              <a:t>Tom Ron</a:t>
             </a:r>
             <a:endParaRPr/>
           </a:p>
@@ -5318,13 +5346,6 @@
 <file path=ppt/slides/slide10.xml><?xml version="1.0" encoding="utf-8"?>
 <p:sld xmlns:a="http://schemas.openxmlformats.org/drawingml/2006/main" xmlns:p="http://schemas.openxmlformats.org/presentationml/2006/main" xmlns:r="http://schemas.openxmlformats.org/officeDocument/2006/relationships">
   <p:cSld>
-    <p:bg>
-      <p:bgPr>
-        <a:blipFill>
-          <a:blip r:embed="rId1"/>
-        </a:blipFill>
-      </p:bgPr>
-    </p:bg>
     <p:spTree>
       <p:nvGrpSpPr>
         <p:cNvPr id="1" name=""/>
@@ -5339,99 +5360,28 @@
           <a:chExt cx="0" cy="0"/>
         </a:xfrm>
       </p:grpSpPr>
-      <p:sp>
-        <p:nvSpPr>
-          <p:cNvPr id="155" name="CustomShape 1"/>
-          <p:cNvSpPr/>
+      <p:pic>
+        <p:nvPicPr>
+          <p:cNvPr descr="" id="153" name=""/>
+          <p:cNvPicPr/>
           <p:nvPr/>
-        </p:nvSpPr>
-        <p:spPr>
-          <a:xfrm>
-            <a:off x="1831680" y="427320"/>
-            <a:ext cx="7015320" cy="1142280"/>
-          </a:xfrm>
-          <a:prstGeom prst="rect">
-            <a:avLst/>
-          </a:prstGeom>
-        </p:spPr>
-        <p:txBody>
-          <a:bodyPr anchor="ctr" bIns="45000" lIns="90000" rIns="90000" tIns="45000"/>
-          <a:p>
-            <a:pPr>
-              <a:lnSpc>
-                <a:spcPct val="100000"/>
-              </a:lnSpc>
-            </a:pPr>
-            <a:r>
-              <a:rPr lang="en-US" sz="3600">
-                <a:solidFill>
-                  <a:srgbClr val="ffecbd"/>
-                </a:solidFill>
-                <a:latin typeface="Calibri"/>
-              </a:rPr>
-              <a:t>Learning checkmate</a:t>
-            </a:r>
-            <a:endParaRPr/>
-          </a:p>
-        </p:txBody>
-      </p:sp>
-      <p:sp>
-        <p:nvSpPr>
-          <p:cNvPr id="156" name="CustomShape 2"/>
-          <p:cNvSpPr/>
-          <p:nvPr/>
-        </p:nvSpPr>
-        <p:spPr>
-          <a:xfrm>
-            <a:off x="1831680" y="1596600"/>
-            <a:ext cx="7015320" cy="4275000"/>
-          </a:xfrm>
-          <a:prstGeom prst="rect">
-            <a:avLst/>
-          </a:prstGeom>
-        </p:spPr>
-        <p:txBody>
-          <a:bodyPr bIns="45000" lIns="90000" rIns="90000" tIns="45000"/>
-          <a:p>
-            <a:pPr>
-              <a:lnSpc>
-                <a:spcPct val="100000"/>
-              </a:lnSpc>
-              <a:buFont typeface="Arial"/>
-              <a:buChar char="•"/>
-            </a:pPr>
-            <a:r>
-              <a:rPr lang="en-US" sz="2800">
-                <a:solidFill>
-                  <a:srgbClr val="ffffff"/>
-                </a:solidFill>
-                <a:latin typeface="Calibri"/>
-              </a:rPr>
-              <a:t>Features distribution (highlights):</a:t>
-            </a:r>
-            <a:endParaRPr/>
-          </a:p>
-          <a:p>
-            <a:pPr>
-              <a:lnSpc>
-                <a:spcPct val="100000"/>
-              </a:lnSpc>
-              <a:buFont typeface="Arial"/>
-              <a:buChar char="•"/>
-            </a:pPr>
-            <a:r>
-              <a:rPr lang="en-US" sz="2800">
-                <a:solidFill>
-                  <a:srgbClr val="ffffff"/>
-                </a:solidFill>
-                <a:latin typeface="Calibri"/>
-              </a:rPr>
-              <a:t>ddd</a:t>
-            </a:r>
-            <a:endParaRPr/>
-          </a:p>
-        </p:txBody>
-      </p:sp>
+        </p:nvPicPr>
+        <p:blipFill>
+          <a:blip r:embed="rId1"/>
+          <a:stretch>
+            <a:fillRect/>
+          </a:stretch>
+        </p:blipFill>
+        <p:spPr>
+          <a:xfrm>
+            <a:off x="879480" y="642600"/>
+            <a:ext cx="7424280" cy="5595480"/>
+          </a:xfrm>
+          <a:prstGeom prst="rect">
+            <a:avLst/>
+          </a:prstGeom>
+        </p:spPr>
+      </p:pic>
     </p:spTree>
   </p:cSld>
   <p:timing>
@@ -5469,13 +5419,6 @@
 <file path=ppt/slides/slide11.xml><?xml version="1.0" encoding="utf-8"?>
 <p:sld xmlns:a="http://schemas.openxmlformats.org/drawingml/2006/main" xmlns:p="http://schemas.openxmlformats.org/presentationml/2006/main" xmlns:r="http://schemas.openxmlformats.org/officeDocument/2006/relationships">
   <p:cSld>
-    <p:bg>
-      <p:bgPr>
-        <a:blipFill>
-          <a:blip r:embed="rId1"/>
-        </a:blipFill>
-      </p:bgPr>
-    </p:bg>
     <p:spTree>
       <p:nvGrpSpPr>
         <p:cNvPr id="1" name=""/>
@@ -5490,99 +5433,28 @@
           <a:chExt cx="0" cy="0"/>
         </a:xfrm>
       </p:grpSpPr>
-      <p:sp>
-        <p:nvSpPr>
-          <p:cNvPr id="157" name="CustomShape 1"/>
-          <p:cNvSpPr/>
+      <p:pic>
+        <p:nvPicPr>
+          <p:cNvPr descr="" id="154" name=""/>
+          <p:cNvPicPr/>
           <p:nvPr/>
-        </p:nvSpPr>
-        <p:spPr>
-          <a:xfrm>
-            <a:off x="1831680" y="427320"/>
-            <a:ext cx="7015320" cy="1142280"/>
-          </a:xfrm>
-          <a:prstGeom prst="rect">
-            <a:avLst/>
-          </a:prstGeom>
-        </p:spPr>
-        <p:txBody>
-          <a:bodyPr anchor="ctr" bIns="45000" lIns="90000" rIns="90000" tIns="45000"/>
-          <a:p>
-            <a:pPr>
-              <a:lnSpc>
-                <a:spcPct val="100000"/>
-              </a:lnSpc>
-            </a:pPr>
-            <a:r>
-              <a:rPr lang="en-US" sz="3600">
-                <a:solidFill>
-                  <a:srgbClr val="ffecbd"/>
-                </a:solidFill>
-                <a:latin typeface="Calibri"/>
-              </a:rPr>
-              <a:t>Learning checkmate</a:t>
-            </a:r>
-            <a:endParaRPr/>
-          </a:p>
-        </p:txBody>
-      </p:sp>
-      <p:sp>
-        <p:nvSpPr>
-          <p:cNvPr id="158" name="CustomShape 2"/>
-          <p:cNvSpPr/>
-          <p:nvPr/>
-        </p:nvSpPr>
-        <p:spPr>
-          <a:xfrm>
-            <a:off x="1831680" y="1596600"/>
-            <a:ext cx="7015320" cy="4275000"/>
-          </a:xfrm>
-          <a:prstGeom prst="rect">
-            <a:avLst/>
-          </a:prstGeom>
-        </p:spPr>
-        <p:txBody>
-          <a:bodyPr bIns="45000" lIns="90000" rIns="90000" tIns="45000"/>
-          <a:p>
-            <a:pPr>
-              <a:lnSpc>
-                <a:spcPct val="100000"/>
-              </a:lnSpc>
-              <a:buFont typeface="Arial"/>
-              <a:buChar char="•"/>
-            </a:pPr>
-            <a:r>
-              <a:rPr lang="en-US" sz="2800">
-                <a:solidFill>
-                  <a:srgbClr val="ffffff"/>
-                </a:solidFill>
-                <a:latin typeface="Calibri"/>
-              </a:rPr>
-              <a:t>Results:</a:t>
-            </a:r>
-            <a:endParaRPr/>
-          </a:p>
-          <a:p>
-            <a:pPr>
-              <a:lnSpc>
-                <a:spcPct val="100000"/>
-              </a:lnSpc>
-              <a:buFont typeface="Arial"/>
-              <a:buChar char="•"/>
-            </a:pPr>
-            <a:r>
-              <a:rPr lang="en-US" sz="2800">
-                <a:solidFill>
-                  <a:srgbClr val="ffffff"/>
-                </a:solidFill>
-                <a:latin typeface="Calibri"/>
-              </a:rPr>
-              <a:t>90% ...</a:t>
-            </a:r>
-            <a:endParaRPr/>
-          </a:p>
-        </p:txBody>
-      </p:sp>
+        </p:nvPicPr>
+        <p:blipFill>
+          <a:blip r:embed="rId1"/>
+          <a:stretch>
+            <a:fillRect/>
+          </a:stretch>
+        </p:blipFill>
+        <p:spPr>
+          <a:xfrm>
+            <a:off x="896760" y="622440"/>
+            <a:ext cx="7424280" cy="5595480"/>
+          </a:xfrm>
+          <a:prstGeom prst="rect">
+            <a:avLst/>
+          </a:prstGeom>
+        </p:spPr>
+      </p:pic>
     </p:spTree>
   </p:cSld>
   <p:timing>
@@ -5634,16 +5506,89 @@
           <a:chExt cx="0" cy="0"/>
         </a:xfrm>
       </p:grpSpPr>
-      <p:sp>
-        <p:nvSpPr>
-          <p:cNvPr id="159" name="CustomShape 1"/>
+      <p:pic>
+        <p:nvPicPr>
+          <p:cNvPr descr="" id="155" name=""/>
+          <p:cNvPicPr/>
+          <p:nvPr/>
+        </p:nvPicPr>
+        <p:blipFill>
+          <a:blip r:embed="rId1"/>
+          <a:stretch>
+            <a:fillRect/>
+          </a:stretch>
+        </p:blipFill>
+        <p:spPr>
+          <a:xfrm>
+            <a:off x="879480" y="642600"/>
+            <a:ext cx="7424280" cy="5595480"/>
+          </a:xfrm>
+          <a:prstGeom prst="rect">
+            <a:avLst/>
+          </a:prstGeom>
+        </p:spPr>
+      </p:pic>
+    </p:spTree>
+  </p:cSld>
+  <p:timing>
+    <p:tnLst>
+      <p:par>
+        <p:cTn dur="indefinite" id="23" nodeType="tmRoot" restart="never">
+          <p:childTnLst>
+            <p:seq>
+              <p:cTn id="24" nodeType="mainSeq">
+                <p:childTnLst/>
+              </p:cTn>
+              <p:prevCondLst>
+                <p:cond delay="0" evt="onPrev">
+                  <p:tgtEl>
+                    <p:sldTgt/>
+                  </p:tgtEl>
+                </p:cond>
+              </p:prevCondLst>
+              <p:nextCondLst>
+                <p:cond delay="0" evt="onNext">
+                  <p:tgtEl>
+                    <p:sldTgt/>
+                  </p:tgtEl>
+                </p:cond>
+              </p:nextCondLst>
+            </p:seq>
+          </p:childTnLst>
+        </p:cTn>
+      </p:par>
+    </p:tnLst>
+  </p:timing>
+</p:sld>
+</file>
+
+<file path=ppt/slides/slide13.xml><?xml version="1.0" encoding="utf-8"?>
+<p:sld xmlns:a="http://schemas.openxmlformats.org/drawingml/2006/main" xmlns:p="http://schemas.openxmlformats.org/presentationml/2006/main" xmlns:r="http://schemas.openxmlformats.org/officeDocument/2006/relationships">
+  <p:cSld>
+    <p:spTree>
+      <p:nvGrpSpPr>
+        <p:cNvPr id="1" name=""/>
+        <p:cNvGrpSpPr/>
+        <p:nvPr/>
+      </p:nvGrpSpPr>
+      <p:grpSpPr>
+        <a:xfrm>
+          <a:off x="0" y="0"/>
+          <a:ext cx="0" cy="0"/>
+          <a:chOff x="0" y="0"/>
+          <a:chExt cx="0" cy="0"/>
+        </a:xfrm>
+      </p:grpSpPr>
+      <p:sp>
+        <p:nvSpPr>
+          <p:cNvPr id="156" name="CustomShape 1"/>
           <p:cNvSpPr/>
           <p:nvPr/>
         </p:nvSpPr>
         <p:spPr>
           <a:xfrm>
-            <a:off x="448920" y="833040"/>
-            <a:ext cx="8228880" cy="1142280"/>
+            <a:off x="457200" y="911520"/>
+            <a:ext cx="8228520" cy="1141920"/>
           </a:xfrm>
           <a:prstGeom prst="rect">
             <a:avLst/>
@@ -5664,7 +5609,7 @@
                 </a:solidFill>
                 <a:latin typeface="Calibri"/>
               </a:rPr>
-              <a:t>Slide Title</a:t>
+              <a:t>Simple move 2.0</a:t>
             </a:r>
             <a:endParaRPr/>
           </a:p>
@@ -5672,57 +5617,29 @@
       </p:sp>
       <p:sp>
         <p:nvSpPr>
-          <p:cNvPr id="160" name="CustomShape 2"/>
+          <p:cNvPr id="157" name="CustomShape 2"/>
           <p:cNvSpPr/>
           <p:nvPr/>
         </p:nvSpPr>
         <p:spPr>
           <a:xfrm>
-            <a:off x="448920" y="2002320"/>
-            <a:ext cx="4039560" cy="639000"/>
-          </a:xfrm>
-          <a:prstGeom prst="rect">
-            <a:avLst/>
-          </a:prstGeom>
-        </p:spPr>
-        <p:txBody>
-          <a:bodyPr anchor="b" bIns="45000" lIns="90000" rIns="90000" tIns="45000"/>
+            <a:off x="457200" y="2054520"/>
+            <a:ext cx="8228520" cy="3917880"/>
+          </a:xfrm>
+          <a:prstGeom prst="rect">
+            <a:avLst/>
+          </a:prstGeom>
+        </p:spPr>
+        <p:txBody>
+          <a:bodyPr bIns="45000" lIns="90000" rIns="90000" tIns="45000"/>
           <a:p>
             <a:pPr>
               <a:lnSpc>
                 <a:spcPct val="100000"/>
               </a:lnSpc>
             </a:pPr>
-            <a:r>
-              <a:rPr b="1" lang="en-US" sz="2400">
-                <a:solidFill>
-                  <a:srgbClr val="ffffff"/>
-                </a:solidFill>
-                <a:latin typeface="Calibri"/>
-              </a:rPr>
-              <a:t>Product A</a:t>
-            </a:r>
-            <a:endParaRPr/>
-          </a:p>
-        </p:txBody>
-      </p:sp>
-      <p:sp>
-        <p:nvSpPr>
-          <p:cNvPr id="161" name="CustomShape 3"/>
-          <p:cNvSpPr/>
-          <p:nvPr/>
-        </p:nvSpPr>
-        <p:spPr>
-          <a:xfrm>
-            <a:off x="448920" y="2631960"/>
-            <a:ext cx="4039560" cy="3034440"/>
-          </a:xfrm>
-          <a:prstGeom prst="rect">
-            <a:avLst/>
-          </a:prstGeom>
-        </p:spPr>
-        <p:txBody>
-          <a:bodyPr anchor="ctr" bIns="45000" lIns="90000" rIns="90000" tIns="45000"/>
+            <a:endParaRPr/>
+          </a:p>
           <a:p>
             <a:pPr>
               <a:lnSpc>
@@ -5732,13 +5649,13 @@
               <a:buChar char="•"/>
             </a:pPr>
             <a:r>
-              <a:rPr lang="en-US" sz="2400">
+              <a:rPr lang="en-US" sz="2800">
                 <a:solidFill>
                   <a:srgbClr val="ffffff"/>
                 </a:solidFill>
                 <a:latin typeface="Calibri"/>
               </a:rPr>
-              <a:t>Feature 1</a:t>
+              <a:t>For each move output move diff + surround histogram of radius 1</a:t>
             </a:r>
             <a:endParaRPr/>
           </a:p>
@@ -5751,13 +5668,13 @@
               <a:buChar char="•"/>
             </a:pPr>
             <a:r>
-              <a:rPr lang="en-US" sz="2400">
+              <a:rPr lang="en-US" sz="2800">
                 <a:solidFill>
                   <a:srgbClr val="ffffff"/>
                 </a:solidFill>
                 <a:latin typeface="Calibri"/>
               </a:rPr>
-              <a:t>Feature 2</a:t>
+              <a:t>Pros – Efficient on both memory and run time. Takes the surrounding into account.</a:t>
             </a:r>
             <a:endParaRPr/>
           </a:p>
@@ -5770,64 +5687,337 @@
               <a:buChar char="•"/>
             </a:pPr>
             <a:r>
-              <a:rPr lang="en-US" sz="2400">
+              <a:rPr lang="en-US" sz="2800">
                 <a:solidFill>
                   <a:srgbClr val="ffffff"/>
                 </a:solidFill>
                 <a:latin typeface="Calibri"/>
               </a:rPr>
-              <a:t>Feature 3</a:t>
+              <a:t>Cons – Assume different moves are independent of one another \ history – good for most cases but not for castling, en passant, etc.</a:t>
             </a:r>
             <a:endParaRPr/>
           </a:p>
-        </p:txBody>
-      </p:sp>
-      <p:sp>
-        <p:nvSpPr>
-          <p:cNvPr id="162" name="CustomShape 4"/>
-          <p:cNvSpPr/>
-          <p:nvPr/>
-        </p:nvSpPr>
-        <p:spPr>
-          <a:xfrm>
-            <a:off x="4636800" y="2002320"/>
-            <a:ext cx="4041000" cy="639000"/>
-          </a:xfrm>
-          <a:prstGeom prst="rect">
-            <a:avLst/>
-          </a:prstGeom>
-        </p:spPr>
-        <p:txBody>
-          <a:bodyPr anchor="b" bIns="45000" lIns="90000" rIns="90000" tIns="45000"/>
-          <a:p>
-            <a:pPr algn="ctr">
+          <a:p>
+            <a:pPr>
               <a:lnSpc>
                 <a:spcPct val="100000"/>
               </a:lnSpc>
             </a:pPr>
+            <a:endParaRPr/>
+          </a:p>
+          <a:p>
+            <a:pPr>
+              <a:lnSpc>
+                <a:spcPct val="100000"/>
+              </a:lnSpc>
+            </a:pPr>
+            <a:endParaRPr/>
+          </a:p>
+        </p:txBody>
+      </p:sp>
+    </p:spTree>
+  </p:cSld>
+  <p:timing>
+    <p:tnLst>
+      <p:par>
+        <p:cTn dur="indefinite" id="25" nodeType="tmRoot" restart="never">
+          <p:childTnLst>
+            <p:seq>
+              <p:cTn id="26" nodeType="mainSeq">
+                <p:childTnLst/>
+              </p:cTn>
+              <p:prevCondLst>
+                <p:cond delay="0" evt="onPrev">
+                  <p:tgtEl>
+                    <p:sldTgt/>
+                  </p:tgtEl>
+                </p:cond>
+              </p:prevCondLst>
+              <p:nextCondLst>
+                <p:cond delay="0" evt="onNext">
+                  <p:tgtEl>
+                    <p:sldTgt/>
+                  </p:tgtEl>
+                </p:cond>
+              </p:nextCondLst>
+            </p:seq>
+          </p:childTnLst>
+        </p:cTn>
+      </p:par>
+    </p:tnLst>
+  </p:timing>
+</p:sld>
+</file>
+
+<file path=ppt/slides/slide14.xml><?xml version="1.0" encoding="utf-8"?>
+<p:sld xmlns:a="http://schemas.openxmlformats.org/drawingml/2006/main" xmlns:p="http://schemas.openxmlformats.org/presentationml/2006/main" xmlns:r="http://schemas.openxmlformats.org/officeDocument/2006/relationships">
+  <p:cSld>
+    <p:spTree>
+      <p:nvGrpSpPr>
+        <p:cNvPr id="1" name=""/>
+        <p:cNvGrpSpPr/>
+        <p:nvPr/>
+      </p:nvGrpSpPr>
+      <p:grpSpPr>
+        <a:xfrm>
+          <a:off x="0" y="0"/>
+          <a:ext cx="0" cy="0"/>
+          <a:chOff x="0" y="0"/>
+          <a:chExt cx="0" cy="0"/>
+        </a:xfrm>
+      </p:grpSpPr>
+      <p:sp>
+        <p:nvSpPr>
+          <p:cNvPr id="158" name="CustomShape 1"/>
+          <p:cNvSpPr/>
+          <p:nvPr/>
+        </p:nvSpPr>
+        <p:spPr>
+          <a:xfrm>
+            <a:off x="457200" y="911520"/>
+            <a:ext cx="8228520" cy="1141920"/>
+          </a:xfrm>
+          <a:prstGeom prst="rect">
+            <a:avLst/>
+          </a:prstGeom>
+        </p:spPr>
+        <p:txBody>
+          <a:bodyPr anchor="ctr" bIns="45000" lIns="90000" rIns="90000" tIns="45000"/>
+          <a:p>
+            <a:pPr>
+              <a:lnSpc>
+                <a:spcPct val="100000"/>
+              </a:lnSpc>
+            </a:pPr>
             <a:r>
-              <a:rPr b="1" lang="en-US" sz="2400">
+              <a:rPr lang="en-US" sz="3600">
                 <a:solidFill>
-                  <a:srgbClr val="ffffff"/>
+                  <a:srgbClr val="ffecbd"/>
                 </a:solidFill>
                 <a:latin typeface="Calibri"/>
               </a:rPr>
-              <a:t>Product B</a:t>
+              <a:t>Simple move 2.0</a:t>
             </a:r>
             <a:endParaRPr/>
           </a:p>
         </p:txBody>
       </p:sp>
-      <p:sp>
-        <p:nvSpPr>
-          <p:cNvPr id="163" name="CustomShape 5"/>
+      <p:graphicFrame>
+        <p:nvGraphicFramePr>
+          <p:cNvPr id="159" name="Table 2"/>
+          <p:cNvGraphicFramePr/>
+          <p:nvPr/>
+        </p:nvGraphicFramePr>
+        <p:xfrm>
+          <a:off x="1936800" y="2989440"/>
+          <a:ext cx="5469840" cy="2496960"/>
+        </p:xfrm>
+        <a:graphic>
+          <a:graphicData uri="http://schemas.openxmlformats.org/drawingml/2006/table">
+            <a:tbl>
+              <a:tblPr/>
+              <a:tblGrid>
+                <a:gridCol w="1822680"/>
+                <a:gridCol w="1822680"/>
+                <a:gridCol w="1824480"/>
+              </a:tblGrid>
+              <a:tr h="832320">
+                <a:tc>
+                  <a:txBody>
+                    <a:bodyPr bIns="46800" lIns="90000" rIns="90000" tIns="46800" wrap="none"/>
+                    <a:p>
+                      <a:pPr algn="ctr"/>
+                      <a:r>
+                        <a:rPr lang="en-US"/>
+                        <a:t>0</a:t>
+                      </a:r>
+                      <a:endParaRPr/>
+                    </a:p>
+                  </a:txBody>
+                  <a:tcPr/>
+                </a:tc>
+                <a:tc>
+                  <a:txBody>
+                    <a:bodyPr bIns="46800" lIns="90000" rIns="90000" tIns="46800" wrap="none"/>
+                    <a:p>
+                      <a:pPr algn="ctr"/>
+                      <a:r>
+                        <a:rPr lang="en-US"/>
+                        <a:t>1</a:t>
+                      </a:r>
+                      <a:endParaRPr/>
+                    </a:p>
+                  </a:txBody>
+                  <a:tcPr/>
+                </a:tc>
+                <a:tc>
+                  <a:txBody>
+                    <a:bodyPr bIns="46800" lIns="90000" rIns="90000" tIns="46800" wrap="none"/>
+                    <a:p>
+                      <a:pPr algn="ctr"/>
+                      <a:r>
+                        <a:rPr lang="en-US"/>
+                        <a:t>2</a:t>
+                      </a:r>
+                      <a:endParaRPr/>
+                    </a:p>
+                  </a:txBody>
+                  <a:tcPr/>
+                </a:tc>
+              </a:tr>
+              <a:tr h="832320">
+                <a:tc>
+                  <a:txBody>
+                    <a:bodyPr bIns="46800" lIns="90000" rIns="90000" tIns="46800" wrap="none"/>
+                    <a:p>
+                      <a:pPr algn="ctr"/>
+                      <a:r>
+                        <a:rPr lang="en-US"/>
+                        <a:t>3</a:t>
+                      </a:r>
+                      <a:endParaRPr/>
+                    </a:p>
+                  </a:txBody>
+                  <a:tcPr/>
+                </a:tc>
+                <a:tc>
+                  <a:txBody>
+                    <a:bodyPr bIns="46800" lIns="90000" rIns="90000" tIns="46800" wrap="none"/>
+                    <a:p>
+                      <a:pPr algn="ctr"/>
+                      <a:r>
+                        <a:rPr lang="en-US"/>
+                        <a:t>B, R, K, N, Q, P</a:t>
+                      </a:r>
+                      <a:endParaRPr/>
+                    </a:p>
+                  </a:txBody>
+                  <a:tcPr/>
+                </a:tc>
+                <a:tc>
+                  <a:txBody>
+                    <a:bodyPr bIns="46800" lIns="90000" rIns="90000" tIns="46800" wrap="none"/>
+                    <a:p>
+                      <a:pPr algn="ctr"/>
+                      <a:r>
+                        <a:rPr lang="en-US"/>
+                        <a:t>5</a:t>
+                      </a:r>
+                      <a:endParaRPr/>
+                    </a:p>
+                  </a:txBody>
+                  <a:tcPr/>
+                </a:tc>
+              </a:tr>
+              <a:tr h="832320">
+                <a:tc>
+                  <a:txBody>
+                    <a:bodyPr bIns="46800" lIns="90000" rIns="90000" tIns="46800" wrap="none"/>
+                    <a:p>
+                      <a:pPr algn="ctr"/>
+                      <a:r>
+                        <a:rPr lang="en-US"/>
+                        <a:t>6</a:t>
+                      </a:r>
+                      <a:endParaRPr/>
+                    </a:p>
+                  </a:txBody>
+                  <a:tcPr/>
+                </a:tc>
+                <a:tc>
+                  <a:txBody>
+                    <a:bodyPr bIns="46800" lIns="90000" rIns="90000" tIns="46800" wrap="none"/>
+                    <a:p>
+                      <a:pPr algn="ctr"/>
+                      <a:r>
+                        <a:rPr lang="en-US"/>
+                        <a:t>7</a:t>
+                      </a:r>
+                      <a:endParaRPr/>
+                    </a:p>
+                  </a:txBody>
+                  <a:tcPr/>
+                </a:tc>
+                <a:tc>
+                  <a:txBody>
+                    <a:bodyPr bIns="46800" lIns="90000" rIns="90000" tIns="46800" wrap="none"/>
+                    <a:p>
+                      <a:pPr algn="ctr"/>
+                      <a:r>
+                        <a:rPr lang="en-US"/>
+                        <a:t>8</a:t>
+                      </a:r>
+                      <a:endParaRPr/>
+                    </a:p>
+                  </a:txBody>
+                  <a:tcPr/>
+                </a:tc>
+              </a:tr>
+            </a:tbl>
+          </a:graphicData>
+        </a:graphic>
+      </p:graphicFrame>
+    </p:spTree>
+  </p:cSld>
+  <p:timing>
+    <p:tnLst>
+      <p:par>
+        <p:cTn dur="indefinite" id="27" nodeType="tmRoot" restart="never">
+          <p:childTnLst>
+            <p:seq>
+              <p:cTn id="28" nodeType="mainSeq">
+                <p:childTnLst/>
+              </p:cTn>
+              <p:prevCondLst>
+                <p:cond delay="0" evt="onPrev">
+                  <p:tgtEl>
+                    <p:sldTgt/>
+                  </p:tgtEl>
+                </p:cond>
+              </p:prevCondLst>
+              <p:nextCondLst>
+                <p:cond delay="0" evt="onNext">
+                  <p:tgtEl>
+                    <p:sldTgt/>
+                  </p:tgtEl>
+                </p:cond>
+              </p:nextCondLst>
+            </p:seq>
+          </p:childTnLst>
+        </p:cTn>
+      </p:par>
+    </p:tnLst>
+  </p:timing>
+</p:sld>
+</file>
+
+<file path=ppt/slides/slide15.xml><?xml version="1.0" encoding="utf-8"?>
+<p:sld xmlns:a="http://schemas.openxmlformats.org/drawingml/2006/main" xmlns:p="http://schemas.openxmlformats.org/presentationml/2006/main" xmlns:r="http://schemas.openxmlformats.org/officeDocument/2006/relationships">
+  <p:cSld>
+    <p:spTree>
+      <p:nvGrpSpPr>
+        <p:cNvPr id="1" name=""/>
+        <p:cNvGrpSpPr/>
+        <p:nvPr/>
+      </p:nvGrpSpPr>
+      <p:grpSpPr>
+        <a:xfrm>
+          <a:off x="0" y="0"/>
+          <a:ext cx="0" cy="0"/>
+          <a:chOff x="0" y="0"/>
+          <a:chExt cx="0" cy="0"/>
+        </a:xfrm>
+      </p:grpSpPr>
+      <p:sp>
+        <p:nvSpPr>
+          <p:cNvPr id="160" name="CustomShape 1"/>
           <p:cNvSpPr/>
           <p:nvPr/>
         </p:nvSpPr>
         <p:spPr>
           <a:xfrm>
-            <a:off x="4636800" y="2631960"/>
-            <a:ext cx="4041000" cy="3034440"/>
+            <a:off x="457200" y="911520"/>
+            <a:ext cx="8228520" cy="1141920"/>
           </a:xfrm>
           <a:prstGeom prst="rect">
             <a:avLst/>
@@ -5836,66 +6026,1861 @@
         <p:txBody>
           <a:bodyPr anchor="ctr" bIns="45000" lIns="90000" rIns="90000" tIns="45000"/>
           <a:p>
-            <a:pPr algn="r">
+            <a:pPr>
               <a:lnSpc>
                 <a:spcPct val="100000"/>
               </a:lnSpc>
-              <a:buFont typeface="Arial"/>
-              <a:buChar char="•"/>
             </a:pPr>
             <a:r>
-              <a:rPr lang="en-US" sz="2400">
+              <a:rPr lang="en-US" sz="3600">
                 <a:solidFill>
-                  <a:srgbClr val="ffffff"/>
+                  <a:srgbClr val="ffecbd"/>
                 </a:solidFill>
                 <a:latin typeface="Calibri"/>
               </a:rPr>
-              <a:t>Feature 1</a:t>
+              <a:t>Simple move 2.0</a:t>
             </a:r>
             <a:endParaRPr/>
           </a:p>
-          <a:p>
-            <a:pPr algn="r">
+        </p:txBody>
+      </p:sp>
+      <p:graphicFrame>
+        <p:nvGraphicFramePr>
+          <p:cNvPr id="161" name="Table 2"/>
+          <p:cNvGraphicFramePr/>
+          <p:nvPr/>
+        </p:nvGraphicFramePr>
+        <p:xfrm>
+          <a:off x="209160" y="2131200"/>
+          <a:ext cx="8709840" cy="731880"/>
+        </p:xfrm>
+        <a:graphic>
+          <a:graphicData uri="http://schemas.openxmlformats.org/drawingml/2006/table">
+            <a:tbl>
+              <a:tblPr/>
+              <a:tblGrid>
+                <a:gridCol w="1594080"/>
+                <a:gridCol w="2575440"/>
+                <a:gridCol w="2089800"/>
+                <a:gridCol w="2450520"/>
+              </a:tblGrid>
+              <a:tr h="598320">
+                <a:tc>
+                  <a:txBody>
+                    <a:bodyPr bIns="46800" lIns="90000" rIns="90000" tIns="46800" wrap="none"/>
+                    <a:p>
+                      <a:pPr algn="ctr"/>
+                      <a:r>
+                        <a:rPr lang="en-US"/>
+                        <a:t>Piece</a:t>
+                      </a:r>
+                      <a:endParaRPr/>
+                    </a:p>
+                  </a:txBody>
+                  <a:tcPr/>
+                </a:tc>
+                <a:tc>
+                  <a:txBody>
+                    <a:bodyPr bIns="46800" lIns="90000" rIns="90000" tIns="46800" wrap="none"/>
+                    <a:p>
+                      <a:pPr algn="ctr"/>
+                      <a:r>
+                        <a:rPr lang="en-US"/>
+                        <a:t>Move diff</a:t>
+                      </a:r>
+                      <a:endParaRPr/>
+                    </a:p>
+                  </a:txBody>
+                  <a:tcPr/>
+                </a:tc>
+                <a:tc>
+                  <a:txBody>
+                    <a:bodyPr bIns="46800" lIns="90000" rIns="90000" tIns="46800" wrap="none"/>
+                    <a:p>
+                      <a:pPr algn="ctr"/>
+                      <a:r>
+                        <a:rPr lang="en-US"/>
+                        <a:t>Relative location</a:t>
+                      </a:r>
+                      <a:endParaRPr/>
+                    </a:p>
+                  </a:txBody>
+                  <a:tcPr/>
+                </a:tc>
+                <a:tc>
+                  <a:txBody>
+                    <a:bodyPr bIns="46800" lIns="90000" rIns="90000" tIns="46800" wrap="none"/>
+                    <a:p>
+                      <a:pPr algn="ctr"/>
+                      <a:r>
+                        <a:rPr lang="en-US"/>
+                        <a:t>Content</a:t>
+                      </a:r>
+                      <a:endParaRPr/>
+                    </a:p>
+                  </a:txBody>
+                  <a:tcPr/>
+                </a:tc>
+              </a:tr>
+              <a:tr h="366120">
+                <a:tc>
+                  <a:txBody>
+                    <a:bodyPr bIns="46800" lIns="90000" rIns="90000" tIns="46800" wrap="none"/>
+                    <a:p>
+                      <a:pPr algn="ctr"/>
+                      <a:r>
+                        <a:rPr lang="en-US"/>
+                        <a:t>Queen</a:t>
+                      </a:r>
+                      <a:endParaRPr/>
+                    </a:p>
+                  </a:txBody>
+                  <a:tcPr/>
+                </a:tc>
+                <a:tc>
+                  <a:txBody>
+                    <a:bodyPr bIns="46800" lIns="90000" rIns="90000" tIns="46800" wrap="none"/>
+                    <a:p>
+                      <a:pPr algn="ctr"/>
+                      <a:r>
+                        <a:rPr lang="en-US"/>
+                        <a:t>(-2, -2), (-3, -3), (-4,-4), (-5, -5), (-6,-6), (-7, -7)</a:t>
+                      </a:r>
+                      <a:endParaRPr/>
+                    </a:p>
+                  </a:txBody>
+                  <a:tcPr/>
+                </a:tc>
+                <a:tc>
+                  <a:txBody>
+                    <a:bodyPr bIns="46800" lIns="90000" rIns="90000" tIns="46800" wrap="none"/>
+                    <a:p>
+                      <a:pPr algn="ctr"/>
+                      <a:r>
+                        <a:rPr lang="en-US"/>
+                        <a:t>0</a:t>
+                      </a:r>
+                      <a:endParaRPr/>
+                    </a:p>
+                  </a:txBody>
+                  <a:tcPr/>
+                </a:tc>
+                <a:tc>
+                  <a:txBody>
+                    <a:bodyPr bIns="46800" lIns="90000" rIns="90000" tIns="46800" wrap="none"/>
+                    <a:p>
+                      <a:pPr algn="ctr"/>
+                      <a:r>
+                        <a:rPr lang="en-US"/>
+                        <a:t>Free</a:t>
+                      </a:r>
+                      <a:endParaRPr/>
+                    </a:p>
+                  </a:txBody>
+                  <a:tcPr/>
+                </a:tc>
+              </a:tr>
+            </a:tbl>
+          </a:graphicData>
+        </a:graphic>
+      </p:graphicFrame>
+      <p:graphicFrame>
+        <p:nvGraphicFramePr>
+          <p:cNvPr id="162" name="Table 3"/>
+          <p:cNvGraphicFramePr/>
+          <p:nvPr/>
+        </p:nvGraphicFramePr>
+        <p:xfrm>
+          <a:off x="1791720" y="3831480"/>
+          <a:ext cx="5469840" cy="2496960"/>
+        </p:xfrm>
+        <a:graphic>
+          <a:graphicData uri="http://schemas.openxmlformats.org/drawingml/2006/table">
+            <a:tbl>
+              <a:tblPr/>
+              <a:tblGrid>
+                <a:gridCol w="1822680"/>
+                <a:gridCol w="1822680"/>
+                <a:gridCol w="1824480"/>
+              </a:tblGrid>
+              <a:tr h="832320">
+                <a:tc>
+                  <a:txBody>
+                    <a:bodyPr bIns="46800" lIns="90000" rIns="90000" tIns="46800" wrap="none"/>
+                    <a:p>
+                      <a:pPr algn="ctr"/>
+                      <a:r>
+                        <a:rPr b="1" lang="en-US"/>
+                        <a:t>Free</a:t>
+                      </a:r>
+                      <a:endParaRPr/>
+                    </a:p>
+                  </a:txBody>
+                  <a:tcPr/>
+                </a:tc>
+                <a:tc>
+                  <a:txBody>
+                    <a:bodyPr bIns="46800" lIns="90000" rIns="90000" tIns="46800" wrap="none"/>
+                    <a:p>
+                      <a:pPr algn="ctr"/>
+                      <a:r>
+                        <a:rPr lang="en-US"/>
+                        <a:t>1</a:t>
+                      </a:r>
+                      <a:endParaRPr/>
+                    </a:p>
+                  </a:txBody>
+                  <a:tcPr/>
+                </a:tc>
+                <a:tc>
+                  <a:txBody>
+                    <a:bodyPr bIns="46800" lIns="90000" rIns="90000" tIns="46800" wrap="none"/>
+                    <a:p>
+                      <a:pPr algn="ctr"/>
+                      <a:r>
+                        <a:rPr lang="en-US"/>
+                        <a:t>2</a:t>
+                      </a:r>
+                      <a:endParaRPr/>
+                    </a:p>
+                  </a:txBody>
+                  <a:tcPr/>
+                </a:tc>
+              </a:tr>
+              <a:tr h="832320">
+                <a:tc>
+                  <a:txBody>
+                    <a:bodyPr bIns="46800" lIns="90000" rIns="90000" tIns="46800" wrap="none"/>
+                    <a:p>
+                      <a:pPr algn="ctr"/>
+                      <a:r>
+                        <a:rPr lang="en-US"/>
+                        <a:t>3</a:t>
+                      </a:r>
+                      <a:endParaRPr/>
+                    </a:p>
+                  </a:txBody>
+                  <a:tcPr/>
+                </a:tc>
+                <a:tc>
+                  <a:txBody>
+                    <a:bodyPr bIns="46800" lIns="90000" rIns="90000" tIns="46800" wrap="none"/>
+                    <a:p>
+                      <a:pPr algn="ctr"/>
+                      <a:r>
+                        <a:rPr lang="en-US"/>
+                        <a:t>Q</a:t>
+                      </a:r>
+                      <a:endParaRPr/>
+                    </a:p>
+                  </a:txBody>
+                  <a:tcPr/>
+                </a:tc>
+                <a:tc>
+                  <a:txBody>
+                    <a:bodyPr bIns="46800" lIns="90000" rIns="90000" tIns="46800" wrap="none"/>
+                    <a:p>
+                      <a:pPr algn="ctr"/>
+                      <a:r>
+                        <a:rPr lang="en-US"/>
+                        <a:t>5</a:t>
+                      </a:r>
+                      <a:endParaRPr/>
+                    </a:p>
+                  </a:txBody>
+                  <a:tcPr/>
+                </a:tc>
+              </a:tr>
+              <a:tr h="832320">
+                <a:tc>
+                  <a:txBody>
+                    <a:bodyPr bIns="46800" lIns="90000" rIns="90000" tIns="46800" wrap="none"/>
+                    <a:p>
+                      <a:pPr algn="ctr"/>
+                      <a:r>
+                        <a:rPr lang="en-US"/>
+                        <a:t>6</a:t>
+                      </a:r>
+                      <a:endParaRPr/>
+                    </a:p>
+                  </a:txBody>
+                  <a:tcPr/>
+                </a:tc>
+                <a:tc>
+                  <a:txBody>
+                    <a:bodyPr bIns="46800" lIns="90000" rIns="90000" tIns="46800" wrap="none"/>
+                    <a:p>
+                      <a:pPr algn="ctr"/>
+                      <a:r>
+                        <a:rPr lang="en-US"/>
+                        <a:t>7</a:t>
+                      </a:r>
+                      <a:endParaRPr/>
+                    </a:p>
+                  </a:txBody>
+                  <a:tcPr/>
+                </a:tc>
+                <a:tc>
+                  <a:txBody>
+                    <a:bodyPr bIns="46800" lIns="90000" rIns="90000" tIns="46800" wrap="none"/>
+                    <a:p>
+                      <a:pPr algn="ctr"/>
+                      <a:r>
+                        <a:rPr lang="en-US"/>
+                        <a:t>8</a:t>
+                      </a:r>
+                      <a:endParaRPr/>
+                    </a:p>
+                  </a:txBody>
+                  <a:tcPr/>
+                </a:tc>
+              </a:tr>
+            </a:tbl>
+          </a:graphicData>
+        </a:graphic>
+      </p:graphicFrame>
+    </p:spTree>
+  </p:cSld>
+  <p:timing>
+    <p:tnLst>
+      <p:par>
+        <p:cTn dur="indefinite" id="29" nodeType="tmRoot" restart="never">
+          <p:childTnLst>
+            <p:seq>
+              <p:cTn id="30" nodeType="mainSeq">
+                <p:childTnLst/>
+              </p:cTn>
+              <p:prevCondLst>
+                <p:cond delay="0" evt="onPrev">
+                  <p:tgtEl>
+                    <p:sldTgt/>
+                  </p:tgtEl>
+                </p:cond>
+              </p:prevCondLst>
+              <p:nextCondLst>
+                <p:cond delay="0" evt="onNext">
+                  <p:tgtEl>
+                    <p:sldTgt/>
+                  </p:tgtEl>
+                </p:cond>
+              </p:nextCondLst>
+            </p:seq>
+          </p:childTnLst>
+        </p:cTn>
+      </p:par>
+    </p:tnLst>
+  </p:timing>
+</p:sld>
+</file>
+
+<file path=ppt/slides/slide16.xml><?xml version="1.0" encoding="utf-8"?>
+<p:sld xmlns:a="http://schemas.openxmlformats.org/drawingml/2006/main" xmlns:p="http://schemas.openxmlformats.org/presentationml/2006/main" xmlns:r="http://schemas.openxmlformats.org/officeDocument/2006/relationships">
+  <p:cSld>
+    <p:spTree>
+      <p:nvGrpSpPr>
+        <p:cNvPr id="1" name=""/>
+        <p:cNvGrpSpPr/>
+        <p:nvPr/>
+      </p:nvGrpSpPr>
+      <p:grpSpPr>
+        <a:xfrm>
+          <a:off x="0" y="0"/>
+          <a:ext cx="0" cy="0"/>
+          <a:chOff x="0" y="0"/>
+          <a:chExt cx="0" cy="0"/>
+        </a:xfrm>
+      </p:grpSpPr>
+      <p:sp>
+        <p:nvSpPr>
+          <p:cNvPr id="163" name="CustomShape 1"/>
+          <p:cNvSpPr/>
+          <p:nvPr/>
+        </p:nvSpPr>
+        <p:spPr>
+          <a:xfrm>
+            <a:off x="457200" y="911520"/>
+            <a:ext cx="8228520" cy="1141920"/>
+          </a:xfrm>
+          <a:prstGeom prst="rect">
+            <a:avLst/>
+          </a:prstGeom>
+        </p:spPr>
+        <p:txBody>
+          <a:bodyPr anchor="ctr" bIns="45000" lIns="90000" rIns="90000" tIns="45000"/>
+          <a:p>
+            <a:pPr>
               <a:lnSpc>
                 <a:spcPct val="100000"/>
               </a:lnSpc>
-              <a:buFont typeface="Arial"/>
-              <a:buChar char="•"/>
             </a:pPr>
             <a:r>
-              <a:rPr lang="en-US" sz="2400">
+              <a:rPr lang="en-US" sz="3600">
                 <a:solidFill>
-                  <a:srgbClr val="ffffff"/>
+                  <a:srgbClr val="ffecbd"/>
                 </a:solidFill>
                 <a:latin typeface="Calibri"/>
               </a:rPr>
-              <a:t>Feature 2</a:t>
+              <a:t>Simple move 2.0</a:t>
             </a:r>
             <a:endParaRPr/>
           </a:p>
-          <a:p>
-            <a:pPr algn="r">
+        </p:txBody>
+      </p:sp>
+      <p:graphicFrame>
+        <p:nvGraphicFramePr>
+          <p:cNvPr id="164" name="Table 2"/>
+          <p:cNvGraphicFramePr/>
+          <p:nvPr/>
+        </p:nvGraphicFramePr>
+        <p:xfrm>
+          <a:off x="209160" y="2131200"/>
+          <a:ext cx="8709840" cy="731880"/>
+        </p:xfrm>
+        <a:graphic>
+          <a:graphicData uri="http://schemas.openxmlformats.org/drawingml/2006/table">
+            <a:tbl>
+              <a:tblPr/>
+              <a:tblGrid>
+                <a:gridCol w="1594080"/>
+                <a:gridCol w="2575440"/>
+                <a:gridCol w="2089800"/>
+                <a:gridCol w="2450520"/>
+              </a:tblGrid>
+              <a:tr h="598320">
+                <a:tc>
+                  <a:txBody>
+                    <a:bodyPr bIns="46800" lIns="90000" rIns="90000" tIns="46800" wrap="none"/>
+                    <a:p>
+                      <a:pPr algn="ctr"/>
+                      <a:r>
+                        <a:rPr lang="en-US"/>
+                        <a:t>Piece</a:t>
+                      </a:r>
+                      <a:endParaRPr/>
+                    </a:p>
+                  </a:txBody>
+                  <a:tcPr/>
+                </a:tc>
+                <a:tc>
+                  <a:txBody>
+                    <a:bodyPr bIns="46800" lIns="90000" rIns="90000" tIns="46800" wrap="none"/>
+                    <a:p>
+                      <a:pPr algn="ctr"/>
+                      <a:r>
+                        <a:rPr lang="en-US"/>
+                        <a:t>Move diff</a:t>
+                      </a:r>
+                      <a:endParaRPr/>
+                    </a:p>
+                  </a:txBody>
+                  <a:tcPr/>
+                </a:tc>
+                <a:tc>
+                  <a:txBody>
+                    <a:bodyPr bIns="46800" lIns="90000" rIns="90000" tIns="46800" wrap="none"/>
+                    <a:p>
+                      <a:pPr algn="ctr"/>
+                      <a:r>
+                        <a:rPr lang="en-US"/>
+                        <a:t>Relative location</a:t>
+                      </a:r>
+                      <a:endParaRPr/>
+                    </a:p>
+                  </a:txBody>
+                  <a:tcPr/>
+                </a:tc>
+                <a:tc>
+                  <a:txBody>
+                    <a:bodyPr bIns="46800" lIns="90000" rIns="90000" tIns="46800" wrap="none"/>
+                    <a:p>
+                      <a:pPr algn="ctr"/>
+                      <a:r>
+                        <a:rPr lang="en-US"/>
+                        <a:t>Content</a:t>
+                      </a:r>
+                      <a:endParaRPr/>
+                    </a:p>
+                  </a:txBody>
+                  <a:tcPr/>
+                </a:tc>
+              </a:tr>
+              <a:tr h="867240">
+                <a:tc>
+                  <a:txBody>
+                    <a:bodyPr bIns="46800" lIns="90000" rIns="90000" tIns="46800" wrap="none"/>
+                    <a:p>
+                      <a:pPr algn="ctr"/>
+                      <a:r>
+                        <a:rPr lang="en-US"/>
+                        <a:t>Queen</a:t>
+                      </a:r>
+                      <a:endParaRPr/>
+                    </a:p>
+                  </a:txBody>
+                  <a:tcPr/>
+                </a:tc>
+                <a:tc>
+                  <a:txBody>
+                    <a:bodyPr bIns="46800" lIns="90000" rIns="90000" tIns="46800" wrap="none"/>
+                    <a:p>
+                      <a:pPr algn="ctr"/>
+                      <a:r>
+                        <a:rPr lang="en-US"/>
+                        <a:t>(-7, 7)</a:t>
+                      </a:r>
+                      <a:endParaRPr/>
+                    </a:p>
+                  </a:txBody>
+                  <a:tcPr/>
+                </a:tc>
+                <a:tc>
+                  <a:txBody>
+                    <a:bodyPr bIns="46800" lIns="90000" rIns="90000" tIns="46800" wrap="none"/>
+                    <a:p>
+                      <a:pPr algn="ctr"/>
+                      <a:r>
+                        <a:rPr lang="en-US"/>
+                        <a:t>2</a:t>
+                      </a:r>
+                      <a:endParaRPr/>
+                    </a:p>
+                    <a:p>
+                      <a:pPr algn="ctr"/>
+                      <a:r>
+                        <a:rPr lang="en-US"/>
+                        <a:t>6</a:t>
+                      </a:r>
+                      <a:endParaRPr/>
+                    </a:p>
+                  </a:txBody>
+                  <a:tcPr/>
+                </a:tc>
+                <a:tc>
+                  <a:txBody>
+                    <a:bodyPr bIns="46800" lIns="90000" rIns="90000" tIns="46800" wrap="none"/>
+                    <a:p>
+                      <a:pPr algn="ctr"/>
+                      <a:r>
+                        <a:rPr lang="en-US"/>
+                        <a:t>Out of the board</a:t>
+                      </a:r>
+                      <a:endParaRPr/>
+                    </a:p>
+                    <a:p>
+                      <a:pPr algn="ctr"/>
+                      <a:r>
+                        <a:rPr lang="en-US"/>
+                        <a:t>Free</a:t>
+                      </a:r>
+                      <a:endParaRPr/>
+                    </a:p>
+                  </a:txBody>
+                  <a:tcPr/>
+                </a:tc>
+              </a:tr>
+            </a:tbl>
+          </a:graphicData>
+        </a:graphic>
+      </p:graphicFrame>
+      <p:graphicFrame>
+        <p:nvGraphicFramePr>
+          <p:cNvPr id="165" name="Table 3"/>
+          <p:cNvGraphicFramePr/>
+          <p:nvPr/>
+        </p:nvGraphicFramePr>
+        <p:xfrm>
+          <a:off x="1791720" y="3831480"/>
+          <a:ext cx="5469840" cy="2496960"/>
+        </p:xfrm>
+        <a:graphic>
+          <a:graphicData uri="http://schemas.openxmlformats.org/drawingml/2006/table">
+            <a:tbl>
+              <a:tblPr/>
+              <a:tblGrid>
+                <a:gridCol w="1822680"/>
+                <a:gridCol w="1822680"/>
+                <a:gridCol w="1824480"/>
+              </a:tblGrid>
+              <a:tr h="832320">
+                <a:tc>
+                  <a:txBody>
+                    <a:bodyPr bIns="46800" lIns="90000" rIns="90000" tIns="46800" wrap="none"/>
+                    <a:p>
+                      <a:pPr algn="ctr"/>
+                      <a:r>
+                        <a:rPr lang="en-US"/>
+                        <a:t>0</a:t>
+                      </a:r>
+                      <a:endParaRPr/>
+                    </a:p>
+                  </a:txBody>
+                  <a:tcPr/>
+                </a:tc>
+                <a:tc>
+                  <a:txBody>
+                    <a:bodyPr bIns="46800" lIns="90000" rIns="90000" tIns="46800" wrap="none"/>
+                    <a:p>
+                      <a:pPr algn="ctr"/>
+                      <a:r>
+                        <a:rPr lang="en-US"/>
+                        <a:t>1</a:t>
+                      </a:r>
+                      <a:endParaRPr/>
+                    </a:p>
+                  </a:txBody>
+                  <a:tcPr/>
+                </a:tc>
+                <a:tc>
+                  <a:txBody>
+                    <a:bodyPr bIns="46800" lIns="90000" rIns="90000" tIns="46800" wrap="none"/>
+                    <a:p>
+                      <a:pPr algn="ctr"/>
+                      <a:r>
+                        <a:rPr b="1" lang="en-US"/>
+                        <a:t>Out of the Board</a:t>
+                      </a:r>
+                      <a:endParaRPr/>
+                    </a:p>
+                  </a:txBody>
+                  <a:tcPr/>
+                </a:tc>
+              </a:tr>
+              <a:tr h="832320">
+                <a:tc>
+                  <a:txBody>
+                    <a:bodyPr bIns="46800" lIns="90000" rIns="90000" tIns="46800" wrap="none"/>
+                    <a:p>
+                      <a:pPr algn="ctr"/>
+                      <a:r>
+                        <a:rPr lang="en-US"/>
+                        <a:t>3</a:t>
+                      </a:r>
+                      <a:endParaRPr/>
+                    </a:p>
+                  </a:txBody>
+                  <a:tcPr/>
+                </a:tc>
+                <a:tc>
+                  <a:txBody>
+                    <a:bodyPr bIns="46800" lIns="90000" rIns="90000" tIns="46800" wrap="none"/>
+                    <a:p>
+                      <a:pPr algn="ctr"/>
+                      <a:r>
+                        <a:rPr lang="en-US"/>
+                        <a:t>Q</a:t>
+                      </a:r>
+                      <a:endParaRPr/>
+                    </a:p>
+                  </a:txBody>
+                  <a:tcPr/>
+                </a:tc>
+                <a:tc>
+                  <a:txBody>
+                    <a:bodyPr bIns="46800" lIns="90000" rIns="90000" tIns="46800" wrap="none"/>
+                    <a:p>
+                      <a:pPr algn="ctr"/>
+                      <a:r>
+                        <a:rPr lang="en-US"/>
+                        <a:t>5</a:t>
+                      </a:r>
+                      <a:endParaRPr/>
+                    </a:p>
+                  </a:txBody>
+                  <a:tcPr/>
+                </a:tc>
+              </a:tr>
+              <a:tr h="832320">
+                <a:tc>
+                  <a:txBody>
+                    <a:bodyPr bIns="46800" lIns="90000" rIns="90000" tIns="46800" wrap="none"/>
+                    <a:p>
+                      <a:pPr algn="ctr"/>
+                      <a:r>
+                        <a:rPr b="1" lang="en-US"/>
+                        <a:t>Free</a:t>
+                      </a:r>
+                      <a:endParaRPr/>
+                    </a:p>
+                  </a:txBody>
+                  <a:tcPr/>
+                </a:tc>
+                <a:tc>
+                  <a:txBody>
+                    <a:bodyPr bIns="46800" lIns="90000" rIns="90000" tIns="46800" wrap="none"/>
+                    <a:p>
+                      <a:pPr algn="ctr"/>
+                      <a:r>
+                        <a:rPr lang="en-US"/>
+                        <a:t>7</a:t>
+                      </a:r>
+                      <a:endParaRPr/>
+                    </a:p>
+                  </a:txBody>
+                  <a:tcPr/>
+                </a:tc>
+                <a:tc>
+                  <a:txBody>
+                    <a:bodyPr bIns="46800" lIns="90000" rIns="90000" tIns="46800" wrap="none"/>
+                    <a:p>
+                      <a:pPr algn="ctr"/>
+                      <a:r>
+                        <a:rPr lang="en-US"/>
+                        <a:t>8</a:t>
+                      </a:r>
+                      <a:endParaRPr/>
+                    </a:p>
+                  </a:txBody>
+                  <a:tcPr/>
+                </a:tc>
+              </a:tr>
+            </a:tbl>
+          </a:graphicData>
+        </a:graphic>
+      </p:graphicFrame>
+    </p:spTree>
+  </p:cSld>
+  <p:timing>
+    <p:tnLst>
+      <p:par>
+        <p:cTn dur="indefinite" id="31" nodeType="tmRoot" restart="never">
+          <p:childTnLst>
+            <p:seq>
+              <p:cTn id="32" nodeType="mainSeq">
+                <p:childTnLst/>
+              </p:cTn>
+              <p:prevCondLst>
+                <p:cond delay="0" evt="onPrev">
+                  <p:tgtEl>
+                    <p:sldTgt/>
+                  </p:tgtEl>
+                </p:cond>
+              </p:prevCondLst>
+              <p:nextCondLst>
+                <p:cond delay="0" evt="onNext">
+                  <p:tgtEl>
+                    <p:sldTgt/>
+                  </p:tgtEl>
+                </p:cond>
+              </p:nextCondLst>
+            </p:seq>
+          </p:childTnLst>
+        </p:cTn>
+      </p:par>
+    </p:tnLst>
+  </p:timing>
+</p:sld>
+</file>
+
+<file path=ppt/slides/slide17.xml><?xml version="1.0" encoding="utf-8"?>
+<p:sld xmlns:a="http://schemas.openxmlformats.org/drawingml/2006/main" xmlns:p="http://schemas.openxmlformats.org/presentationml/2006/main" xmlns:r="http://schemas.openxmlformats.org/officeDocument/2006/relationships">
+  <p:cSld>
+    <p:spTree>
+      <p:nvGrpSpPr>
+        <p:cNvPr id="1" name=""/>
+        <p:cNvGrpSpPr/>
+        <p:nvPr/>
+      </p:nvGrpSpPr>
+      <p:grpSpPr>
+        <a:xfrm>
+          <a:off x="0" y="0"/>
+          <a:ext cx="0" cy="0"/>
+          <a:chOff x="0" y="0"/>
+          <a:chExt cx="0" cy="0"/>
+        </a:xfrm>
+      </p:grpSpPr>
+      <p:sp>
+        <p:nvSpPr>
+          <p:cNvPr id="166" name="CustomShape 1"/>
+          <p:cNvSpPr/>
+          <p:nvPr/>
+        </p:nvSpPr>
+        <p:spPr>
+          <a:xfrm>
+            <a:off x="457200" y="911520"/>
+            <a:ext cx="8228520" cy="1141920"/>
+          </a:xfrm>
+          <a:prstGeom prst="rect">
+            <a:avLst/>
+          </a:prstGeom>
+        </p:spPr>
+        <p:txBody>
+          <a:bodyPr anchor="ctr" bIns="45000" lIns="90000" rIns="90000" tIns="45000"/>
+          <a:p>
+            <a:pPr>
               <a:lnSpc>
                 <a:spcPct val="100000"/>
               </a:lnSpc>
-              <a:buFont typeface="Arial"/>
-              <a:buChar char="•"/>
             </a:pPr>
             <a:r>
-              <a:rPr lang="en-US" sz="2400">
+              <a:rPr lang="en-US" sz="3600">
                 <a:solidFill>
-                  <a:srgbClr val="ffffff"/>
+                  <a:srgbClr val="ffecbd"/>
                 </a:solidFill>
                 <a:latin typeface="Calibri"/>
               </a:rPr>
-              <a:t>Feature 3</a:t>
+              <a:t>Simple move 2.0</a:t>
             </a:r>
             <a:endParaRPr/>
           </a:p>
         </p:txBody>
       </p:sp>
+      <p:graphicFrame>
+        <p:nvGraphicFramePr>
+          <p:cNvPr id="167" name="Table 2"/>
+          <p:cNvGraphicFramePr/>
+          <p:nvPr/>
+        </p:nvGraphicFramePr>
+        <p:xfrm>
+          <a:off x="209160" y="2131200"/>
+          <a:ext cx="8709840" cy="731880"/>
+        </p:xfrm>
+        <a:graphic>
+          <a:graphicData uri="http://schemas.openxmlformats.org/drawingml/2006/table">
+            <a:tbl>
+              <a:tblPr/>
+              <a:tblGrid>
+                <a:gridCol w="1594080"/>
+                <a:gridCol w="2575440"/>
+                <a:gridCol w="2089800"/>
+                <a:gridCol w="2450520"/>
+              </a:tblGrid>
+              <a:tr h="598320">
+                <a:tc>
+                  <a:txBody>
+                    <a:bodyPr bIns="46800" lIns="90000" rIns="90000" tIns="46800" wrap="none"/>
+                    <a:p>
+                      <a:pPr algn="ctr"/>
+                      <a:r>
+                        <a:rPr lang="en-US"/>
+                        <a:t>Piece</a:t>
+                      </a:r>
+                      <a:endParaRPr/>
+                    </a:p>
+                  </a:txBody>
+                  <a:tcPr/>
+                </a:tc>
+                <a:tc>
+                  <a:txBody>
+                    <a:bodyPr bIns="46800" lIns="90000" rIns="90000" tIns="46800" wrap="none"/>
+                    <a:p>
+                      <a:pPr algn="ctr"/>
+                      <a:r>
+                        <a:rPr lang="en-US"/>
+                        <a:t>Move diff</a:t>
+                      </a:r>
+                      <a:endParaRPr/>
+                    </a:p>
+                  </a:txBody>
+                  <a:tcPr/>
+                </a:tc>
+                <a:tc>
+                  <a:txBody>
+                    <a:bodyPr bIns="46800" lIns="90000" rIns="90000" tIns="46800" wrap="none"/>
+                    <a:p>
+                      <a:pPr algn="ctr"/>
+                      <a:r>
+                        <a:rPr lang="en-US"/>
+                        <a:t>Relative location</a:t>
+                      </a:r>
+                      <a:endParaRPr/>
+                    </a:p>
+                  </a:txBody>
+                  <a:tcPr/>
+                </a:tc>
+                <a:tc>
+                  <a:txBody>
+                    <a:bodyPr bIns="46800" lIns="90000" rIns="90000" tIns="46800" wrap="none"/>
+                    <a:p>
+                      <a:pPr algn="ctr"/>
+                      <a:r>
+                        <a:rPr lang="en-US"/>
+                        <a:t>Content</a:t>
+                      </a:r>
+                      <a:endParaRPr/>
+                    </a:p>
+                  </a:txBody>
+                  <a:tcPr/>
+                </a:tc>
+              </a:tr>
+              <a:tr h="526320">
+                <a:tc>
+                  <a:txBody>
+                    <a:bodyPr bIns="46800" lIns="90000" rIns="90000" tIns="46800" wrap="none"/>
+                    <a:p>
+                      <a:pPr algn="ctr"/>
+                      <a:r>
+                        <a:rPr lang="en-US"/>
+                        <a:t>King</a:t>
+                      </a:r>
+                      <a:endParaRPr/>
+                    </a:p>
+                  </a:txBody>
+                  <a:tcPr/>
+                </a:tc>
+                <a:tc>
+                  <a:txBody>
+                    <a:bodyPr bIns="46800" lIns="90000" rIns="90000" tIns="46800" wrap="none"/>
+                    <a:p>
+                      <a:pPr algn="ctr"/>
+                      <a:r>
+                        <a:rPr lang="en-US"/>
+                        <a:t>(2,0)</a:t>
+                      </a:r>
+                      <a:endParaRPr/>
+                    </a:p>
+                  </a:txBody>
+                  <a:tcPr/>
+                </a:tc>
+                <a:tc>
+                  <a:txBody>
+                    <a:bodyPr bIns="46800" lIns="90000" rIns="90000" tIns="46800" wrap="none"/>
+                    <a:p>
+                      <a:pPr algn="ctr"/>
+                      <a:r>
+                        <a:rPr lang="en-US"/>
+                        <a:t>5</a:t>
+                      </a:r>
+                      <a:endParaRPr/>
+                    </a:p>
+                  </a:txBody>
+                  <a:tcPr/>
+                </a:tc>
+                <a:tc>
+                  <a:txBody>
+                    <a:bodyPr bIns="46800" lIns="90000" rIns="90000" tIns="46800" wrap="none"/>
+                    <a:p>
+                      <a:pPr algn="ctr"/>
+                      <a:r>
+                        <a:rPr lang="en-US"/>
+                        <a:t>Free</a:t>
+                      </a:r>
+                      <a:endParaRPr/>
+                    </a:p>
+                  </a:txBody>
+                  <a:tcPr/>
+                </a:tc>
+              </a:tr>
+            </a:tbl>
+          </a:graphicData>
+        </a:graphic>
+      </p:graphicFrame>
+      <p:graphicFrame>
+        <p:nvGraphicFramePr>
+          <p:cNvPr id="168" name="Table 3"/>
+          <p:cNvGraphicFramePr/>
+          <p:nvPr/>
+        </p:nvGraphicFramePr>
+        <p:xfrm>
+          <a:off x="1791720" y="3831480"/>
+          <a:ext cx="5469840" cy="2496960"/>
+        </p:xfrm>
+        <a:graphic>
+          <a:graphicData uri="http://schemas.openxmlformats.org/drawingml/2006/table">
+            <a:tbl>
+              <a:tblPr/>
+              <a:tblGrid>
+                <a:gridCol w="1822680"/>
+                <a:gridCol w="1822680"/>
+                <a:gridCol w="1824480"/>
+              </a:tblGrid>
+              <a:tr h="832320">
+                <a:tc>
+                  <a:txBody>
+                    <a:bodyPr bIns="46800" lIns="90000" rIns="90000" tIns="46800" wrap="none"/>
+                    <a:p>
+                      <a:pPr algn="ctr"/>
+                      <a:r>
+                        <a:rPr lang="en-US"/>
+                        <a:t>0</a:t>
+                      </a:r>
+                      <a:endParaRPr/>
+                    </a:p>
+                  </a:txBody>
+                  <a:tcPr/>
+                </a:tc>
+                <a:tc>
+                  <a:txBody>
+                    <a:bodyPr bIns="46800" lIns="90000" rIns="90000" tIns="46800" wrap="none"/>
+                    <a:p>
+                      <a:pPr algn="ctr"/>
+                      <a:r>
+                        <a:rPr lang="en-US"/>
+                        <a:t>1</a:t>
+                      </a:r>
+                      <a:endParaRPr/>
+                    </a:p>
+                  </a:txBody>
+                  <a:tcPr/>
+                </a:tc>
+                <a:tc>
+                  <a:txBody>
+                    <a:bodyPr bIns="46800" lIns="90000" rIns="90000" tIns="46800" wrap="none"/>
+                    <a:p>
+                      <a:pPr algn="ctr"/>
+                      <a:r>
+                        <a:rPr lang="en-US"/>
+                        <a:t>2</a:t>
+                      </a:r>
+                      <a:endParaRPr/>
+                    </a:p>
+                  </a:txBody>
+                  <a:tcPr/>
+                </a:tc>
+              </a:tr>
+              <a:tr h="832320">
+                <a:tc>
+                  <a:txBody>
+                    <a:bodyPr bIns="46800" lIns="90000" rIns="90000" tIns="46800" wrap="none"/>
+                    <a:p>
+                      <a:pPr algn="ctr"/>
+                      <a:r>
+                        <a:rPr lang="en-US"/>
+                        <a:t>3</a:t>
+                      </a:r>
+                      <a:endParaRPr/>
+                    </a:p>
+                  </a:txBody>
+                  <a:tcPr/>
+                </a:tc>
+                <a:tc>
+                  <a:txBody>
+                    <a:bodyPr bIns="46800" lIns="90000" rIns="90000" tIns="46800" wrap="none"/>
+                    <a:p>
+                      <a:pPr algn="ctr"/>
+                      <a:r>
+                        <a:rPr lang="en-US"/>
+                        <a:t>K</a:t>
+                      </a:r>
+                      <a:endParaRPr/>
+                    </a:p>
+                  </a:txBody>
+                  <a:tcPr/>
+                </a:tc>
+                <a:tc>
+                  <a:txBody>
+                    <a:bodyPr bIns="46800" lIns="90000" rIns="90000" tIns="46800" wrap="none"/>
+                    <a:p>
+                      <a:pPr algn="ctr"/>
+                      <a:r>
+                        <a:rPr b="1" lang="en-US"/>
+                        <a:t>Free</a:t>
+                      </a:r>
+                      <a:endParaRPr/>
+                    </a:p>
+                  </a:txBody>
+                  <a:tcPr/>
+                </a:tc>
+              </a:tr>
+              <a:tr h="832320">
+                <a:tc>
+                  <a:txBody>
+                    <a:bodyPr bIns="46800" lIns="90000" rIns="90000" tIns="46800" wrap="none"/>
+                    <a:p>
+                      <a:pPr algn="ctr"/>
+                      <a:r>
+                        <a:rPr lang="en-US"/>
+                        <a:t>6</a:t>
+                      </a:r>
+                      <a:endParaRPr/>
+                    </a:p>
+                  </a:txBody>
+                  <a:tcPr/>
+                </a:tc>
+                <a:tc>
+                  <a:txBody>
+                    <a:bodyPr bIns="46800" lIns="90000" rIns="90000" tIns="46800" wrap="none"/>
+                    <a:p>
+                      <a:pPr algn="ctr"/>
+                      <a:r>
+                        <a:rPr lang="en-US"/>
+                        <a:t>7</a:t>
+                      </a:r>
+                      <a:endParaRPr/>
+                    </a:p>
+                  </a:txBody>
+                  <a:tcPr/>
+                </a:tc>
+                <a:tc>
+                  <a:txBody>
+                    <a:bodyPr bIns="46800" lIns="90000" rIns="90000" tIns="46800" wrap="none"/>
+                    <a:p>
+                      <a:pPr algn="ctr"/>
+                      <a:r>
+                        <a:rPr lang="en-US"/>
+                        <a:t>8</a:t>
+                      </a:r>
+                      <a:endParaRPr/>
+                    </a:p>
+                  </a:txBody>
+                  <a:tcPr/>
+                </a:tc>
+              </a:tr>
+            </a:tbl>
+          </a:graphicData>
+        </a:graphic>
+      </p:graphicFrame>
     </p:spTree>
   </p:cSld>
+  <p:timing>
+    <p:tnLst>
+      <p:par>
+        <p:cTn dur="indefinite" id="33" nodeType="tmRoot" restart="never">
+          <p:childTnLst>
+            <p:seq>
+              <p:cTn id="34" nodeType="mainSeq">
+                <p:childTnLst/>
+              </p:cTn>
+              <p:prevCondLst>
+                <p:cond delay="0" evt="onPrev">
+                  <p:tgtEl>
+                    <p:sldTgt/>
+                  </p:tgtEl>
+                </p:cond>
+              </p:prevCondLst>
+              <p:nextCondLst>
+                <p:cond delay="0" evt="onNext">
+                  <p:tgtEl>
+                    <p:sldTgt/>
+                  </p:tgtEl>
+                </p:cond>
+              </p:nextCondLst>
+            </p:seq>
+          </p:childTnLst>
+        </p:cTn>
+      </p:par>
+    </p:tnLst>
+  </p:timing>
+</p:sld>
+</file>
+
+<file path=ppt/slides/slide18.xml><?xml version="1.0" encoding="utf-8"?>
+<p:sld xmlns:a="http://schemas.openxmlformats.org/drawingml/2006/main" xmlns:p="http://schemas.openxmlformats.org/presentationml/2006/main" xmlns:r="http://schemas.openxmlformats.org/officeDocument/2006/relationships">
+  <p:cSld>
+    <p:spTree>
+      <p:nvGrpSpPr>
+        <p:cNvPr id="1" name=""/>
+        <p:cNvGrpSpPr/>
+        <p:nvPr/>
+      </p:nvGrpSpPr>
+      <p:grpSpPr>
+        <a:xfrm>
+          <a:off x="0" y="0"/>
+          <a:ext cx="0" cy="0"/>
+          <a:chOff x="0" y="0"/>
+          <a:chExt cx="0" cy="0"/>
+        </a:xfrm>
+      </p:grpSpPr>
+      <p:sp>
+        <p:nvSpPr>
+          <p:cNvPr id="169" name="CustomShape 1"/>
+          <p:cNvSpPr/>
+          <p:nvPr/>
+        </p:nvSpPr>
+        <p:spPr>
+          <a:xfrm>
+            <a:off x="457200" y="911520"/>
+            <a:ext cx="8228520" cy="1141920"/>
+          </a:xfrm>
+          <a:prstGeom prst="rect">
+            <a:avLst/>
+          </a:prstGeom>
+        </p:spPr>
+        <p:txBody>
+          <a:bodyPr anchor="ctr" bIns="45000" lIns="90000" rIns="90000" tIns="45000"/>
+          <a:p>
+            <a:pPr>
+              <a:lnSpc>
+                <a:spcPct val="100000"/>
+              </a:lnSpc>
+            </a:pPr>
+            <a:r>
+              <a:rPr lang="en-US" sz="3600">
+                <a:solidFill>
+                  <a:srgbClr val="ffecbd"/>
+                </a:solidFill>
+                <a:latin typeface="Calibri"/>
+              </a:rPr>
+              <a:t>Simple move 2.0</a:t>
+            </a:r>
+            <a:endParaRPr/>
+          </a:p>
+        </p:txBody>
+      </p:sp>
+      <p:graphicFrame>
+        <p:nvGraphicFramePr>
+          <p:cNvPr id="170" name="Table 2"/>
+          <p:cNvGraphicFramePr/>
+          <p:nvPr/>
+        </p:nvGraphicFramePr>
+        <p:xfrm>
+          <a:off x="209160" y="2131200"/>
+          <a:ext cx="8709840" cy="731880"/>
+        </p:xfrm>
+        <a:graphic>
+          <a:graphicData uri="http://schemas.openxmlformats.org/drawingml/2006/table">
+            <a:tbl>
+              <a:tblPr/>
+              <a:tblGrid>
+                <a:gridCol w="1594080"/>
+                <a:gridCol w="2575440"/>
+                <a:gridCol w="2089800"/>
+                <a:gridCol w="2450520"/>
+              </a:tblGrid>
+              <a:tr h="598320">
+                <a:tc>
+                  <a:txBody>
+                    <a:bodyPr bIns="46800" lIns="90000" rIns="90000" tIns="46800" wrap="none"/>
+                    <a:p>
+                      <a:pPr algn="ctr"/>
+                      <a:r>
+                        <a:rPr lang="en-US"/>
+                        <a:t>Piece</a:t>
+                      </a:r>
+                      <a:endParaRPr/>
+                    </a:p>
+                  </a:txBody>
+                  <a:tcPr/>
+                </a:tc>
+                <a:tc>
+                  <a:txBody>
+                    <a:bodyPr bIns="46800" lIns="90000" rIns="90000" tIns="46800" wrap="none"/>
+                    <a:p>
+                      <a:pPr algn="ctr"/>
+                      <a:r>
+                        <a:rPr lang="en-US"/>
+                        <a:t>Move diff</a:t>
+                      </a:r>
+                      <a:endParaRPr/>
+                    </a:p>
+                  </a:txBody>
+                  <a:tcPr/>
+                </a:tc>
+                <a:tc>
+                  <a:txBody>
+                    <a:bodyPr bIns="46800" lIns="90000" rIns="90000" tIns="46800" wrap="none"/>
+                    <a:p>
+                      <a:pPr algn="ctr"/>
+                      <a:r>
+                        <a:rPr lang="en-US"/>
+                        <a:t>Relative location</a:t>
+                      </a:r>
+                      <a:endParaRPr/>
+                    </a:p>
+                  </a:txBody>
+                  <a:tcPr/>
+                </a:tc>
+                <a:tc>
+                  <a:txBody>
+                    <a:bodyPr bIns="46800" lIns="90000" rIns="90000" tIns="46800" wrap="none"/>
+                    <a:p>
+                      <a:pPr algn="ctr"/>
+                      <a:r>
+                        <a:rPr lang="en-US"/>
+                        <a:t>Content</a:t>
+                      </a:r>
+                      <a:endParaRPr/>
+                    </a:p>
+                  </a:txBody>
+                  <a:tcPr/>
+                </a:tc>
+              </a:tr>
+              <a:tr h="526320">
+                <a:tc>
+                  <a:txBody>
+                    <a:bodyPr bIns="46800" lIns="90000" rIns="90000" tIns="46800" wrap="none"/>
+                    <a:p>
+                      <a:pPr algn="ctr"/>
+                      <a:r>
+                        <a:rPr lang="en-US"/>
+                        <a:t>Pawn</a:t>
+                      </a:r>
+                      <a:endParaRPr/>
+                    </a:p>
+                  </a:txBody>
+                  <a:tcPr/>
+                </a:tc>
+                <a:tc>
+                  <a:txBody>
+                    <a:bodyPr bIns="46800" lIns="90000" rIns="90000" tIns="46800" wrap="none"/>
+                    <a:p>
+                      <a:pPr algn="ctr"/>
+                      <a:r>
+                        <a:rPr lang="en-US"/>
+                        <a:t>(0,2), (0,1)</a:t>
+                      </a:r>
+                      <a:endParaRPr/>
+                    </a:p>
+                  </a:txBody>
+                  <a:tcPr/>
+                </a:tc>
+                <a:tc>
+                  <a:txBody>
+                    <a:bodyPr bIns="46800" lIns="90000" rIns="90000" tIns="46800" wrap="none"/>
+                    <a:p>
+                      <a:pPr algn="ctr"/>
+                      <a:r>
+                        <a:rPr lang="en-US"/>
+                        <a:t>7</a:t>
+                      </a:r>
+                      <a:endParaRPr/>
+                    </a:p>
+                  </a:txBody>
+                  <a:tcPr/>
+                </a:tc>
+                <a:tc>
+                  <a:txBody>
+                    <a:bodyPr bIns="46800" lIns="90000" rIns="90000" tIns="46800" wrap="none"/>
+                    <a:p>
+                      <a:pPr algn="ctr"/>
+                      <a:r>
+                        <a:rPr lang="en-US"/>
+                        <a:t>Free</a:t>
+                      </a:r>
+                      <a:endParaRPr/>
+                    </a:p>
+                  </a:txBody>
+                  <a:tcPr/>
+                </a:tc>
+              </a:tr>
+            </a:tbl>
+          </a:graphicData>
+        </a:graphic>
+      </p:graphicFrame>
+      <p:graphicFrame>
+        <p:nvGraphicFramePr>
+          <p:cNvPr id="171" name="Table 3"/>
+          <p:cNvGraphicFramePr/>
+          <p:nvPr/>
+        </p:nvGraphicFramePr>
+        <p:xfrm>
+          <a:off x="1791720" y="3831480"/>
+          <a:ext cx="5469840" cy="2496960"/>
+        </p:xfrm>
+        <a:graphic>
+          <a:graphicData uri="http://schemas.openxmlformats.org/drawingml/2006/table">
+            <a:tbl>
+              <a:tblPr/>
+              <a:tblGrid>
+                <a:gridCol w="1822680"/>
+                <a:gridCol w="1822680"/>
+                <a:gridCol w="1824480"/>
+              </a:tblGrid>
+              <a:tr h="832320">
+                <a:tc>
+                  <a:txBody>
+                    <a:bodyPr bIns="46800" lIns="90000" rIns="90000" tIns="46800" wrap="none"/>
+                    <a:p>
+                      <a:pPr algn="ctr"/>
+                      <a:r>
+                        <a:rPr lang="en-US"/>
+                        <a:t>0</a:t>
+                      </a:r>
+                      <a:endParaRPr/>
+                    </a:p>
+                  </a:txBody>
+                  <a:tcPr/>
+                </a:tc>
+                <a:tc>
+                  <a:txBody>
+                    <a:bodyPr bIns="46800" lIns="90000" rIns="90000" tIns="46800" wrap="none"/>
+                    <a:p>
+                      <a:pPr algn="ctr"/>
+                      <a:r>
+                        <a:rPr lang="en-US"/>
+                        <a:t>1</a:t>
+                      </a:r>
+                      <a:endParaRPr/>
+                    </a:p>
+                  </a:txBody>
+                  <a:tcPr/>
+                </a:tc>
+                <a:tc>
+                  <a:txBody>
+                    <a:bodyPr bIns="46800" lIns="90000" rIns="90000" tIns="46800" wrap="none"/>
+                    <a:p>
+                      <a:pPr algn="ctr"/>
+                      <a:r>
+                        <a:rPr lang="en-US"/>
+                        <a:t>2</a:t>
+                      </a:r>
+                      <a:endParaRPr/>
+                    </a:p>
+                  </a:txBody>
+                  <a:tcPr/>
+                </a:tc>
+              </a:tr>
+              <a:tr h="832320">
+                <a:tc>
+                  <a:txBody>
+                    <a:bodyPr bIns="46800" lIns="90000" rIns="90000" tIns="46800" wrap="none"/>
+                    <a:p>
+                      <a:pPr algn="ctr"/>
+                      <a:r>
+                        <a:rPr lang="en-US"/>
+                        <a:t>3</a:t>
+                      </a:r>
+                      <a:endParaRPr/>
+                    </a:p>
+                  </a:txBody>
+                  <a:tcPr/>
+                </a:tc>
+                <a:tc>
+                  <a:txBody>
+                    <a:bodyPr bIns="46800" lIns="90000" rIns="90000" tIns="46800" wrap="none"/>
+                    <a:p>
+                      <a:pPr algn="ctr"/>
+                      <a:r>
+                        <a:rPr lang="en-US"/>
+                        <a:t>P</a:t>
+                      </a:r>
+                      <a:endParaRPr/>
+                    </a:p>
+                  </a:txBody>
+                  <a:tcPr/>
+                </a:tc>
+                <a:tc>
+                  <a:txBody>
+                    <a:bodyPr bIns="46800" lIns="90000" rIns="90000" tIns="46800" wrap="none"/>
+                    <a:p>
+                      <a:pPr algn="ctr"/>
+                      <a:r>
+                        <a:rPr lang="en-US"/>
+                        <a:t>4</a:t>
+                      </a:r>
+                      <a:endParaRPr/>
+                    </a:p>
+                  </a:txBody>
+                  <a:tcPr/>
+                </a:tc>
+              </a:tr>
+              <a:tr h="832320">
+                <a:tc>
+                  <a:txBody>
+                    <a:bodyPr bIns="46800" lIns="90000" rIns="90000" tIns="46800" wrap="none"/>
+                    <a:p>
+                      <a:pPr algn="ctr"/>
+                      <a:r>
+                        <a:rPr lang="en-US"/>
+                        <a:t>6</a:t>
+                      </a:r>
+                      <a:endParaRPr/>
+                    </a:p>
+                  </a:txBody>
+                  <a:tcPr/>
+                </a:tc>
+                <a:tc>
+                  <a:txBody>
+                    <a:bodyPr bIns="46800" lIns="90000" rIns="90000" tIns="46800" wrap="none"/>
+                    <a:p>
+                      <a:pPr algn="ctr"/>
+                      <a:r>
+                        <a:rPr b="1" lang="en-US"/>
+                        <a:t>Free</a:t>
+                      </a:r>
+                      <a:endParaRPr/>
+                    </a:p>
+                  </a:txBody>
+                  <a:tcPr/>
+                </a:tc>
+                <a:tc>
+                  <a:txBody>
+                    <a:bodyPr bIns="46800" lIns="90000" rIns="90000" tIns="46800" wrap="none"/>
+                    <a:p>
+                      <a:pPr algn="ctr"/>
+                      <a:r>
+                        <a:rPr lang="en-US"/>
+                        <a:t>8</a:t>
+                      </a:r>
+                      <a:endParaRPr/>
+                    </a:p>
+                  </a:txBody>
+                  <a:tcPr/>
+                </a:tc>
+              </a:tr>
+            </a:tbl>
+          </a:graphicData>
+        </a:graphic>
+      </p:graphicFrame>
+    </p:spTree>
+  </p:cSld>
+  <p:timing>
+    <p:tnLst>
+      <p:par>
+        <p:cTn dur="indefinite" id="35" nodeType="tmRoot" restart="never">
+          <p:childTnLst>
+            <p:seq>
+              <p:cTn id="36" nodeType="mainSeq">
+                <p:childTnLst/>
+              </p:cTn>
+              <p:prevCondLst>
+                <p:cond delay="0" evt="onPrev">
+                  <p:tgtEl>
+                    <p:sldTgt/>
+                  </p:tgtEl>
+                </p:cond>
+              </p:prevCondLst>
+              <p:nextCondLst>
+                <p:cond delay="0" evt="onNext">
+                  <p:tgtEl>
+                    <p:sldTgt/>
+                  </p:tgtEl>
+                </p:cond>
+              </p:nextCondLst>
+            </p:seq>
+          </p:childTnLst>
+        </p:cTn>
+      </p:par>
+    </p:tnLst>
+  </p:timing>
+</p:sld>
+</file>
+
+<file path=ppt/slides/slide19.xml><?xml version="1.0" encoding="utf-8"?>
+<p:sld xmlns:a="http://schemas.openxmlformats.org/drawingml/2006/main" xmlns:p="http://schemas.openxmlformats.org/presentationml/2006/main" xmlns:r="http://schemas.openxmlformats.org/officeDocument/2006/relationships">
+  <p:cSld>
+    <p:spTree>
+      <p:nvGrpSpPr>
+        <p:cNvPr id="1" name=""/>
+        <p:cNvGrpSpPr/>
+        <p:nvPr/>
+      </p:nvGrpSpPr>
+      <p:grpSpPr>
+        <a:xfrm>
+          <a:off x="0" y="0"/>
+          <a:ext cx="0" cy="0"/>
+          <a:chOff x="0" y="0"/>
+          <a:chExt cx="0" cy="0"/>
+        </a:xfrm>
+      </p:grpSpPr>
+      <p:sp>
+        <p:nvSpPr>
+          <p:cNvPr id="172" name="CustomShape 1"/>
+          <p:cNvSpPr/>
+          <p:nvPr/>
+        </p:nvSpPr>
+        <p:spPr>
+          <a:xfrm>
+            <a:off x="457200" y="911520"/>
+            <a:ext cx="8228520" cy="1141920"/>
+          </a:xfrm>
+          <a:prstGeom prst="rect">
+            <a:avLst/>
+          </a:prstGeom>
+        </p:spPr>
+        <p:txBody>
+          <a:bodyPr anchor="ctr" bIns="45000" lIns="90000" rIns="90000" tIns="45000"/>
+          <a:p>
+            <a:pPr>
+              <a:lnSpc>
+                <a:spcPct val="100000"/>
+              </a:lnSpc>
+            </a:pPr>
+            <a:r>
+              <a:rPr lang="en-US" sz="3600">
+                <a:solidFill>
+                  <a:srgbClr val="ffecbd"/>
+                </a:solidFill>
+                <a:latin typeface="Calibri"/>
+              </a:rPr>
+              <a:t>Simple move 2.0</a:t>
+            </a:r>
+            <a:endParaRPr/>
+          </a:p>
+        </p:txBody>
+      </p:sp>
+      <p:graphicFrame>
+        <p:nvGraphicFramePr>
+          <p:cNvPr id="173" name="Table 2"/>
+          <p:cNvGraphicFramePr/>
+          <p:nvPr/>
+        </p:nvGraphicFramePr>
+        <p:xfrm>
+          <a:off x="209160" y="2131200"/>
+          <a:ext cx="8709840" cy="731880"/>
+        </p:xfrm>
+        <a:graphic>
+          <a:graphicData uri="http://schemas.openxmlformats.org/drawingml/2006/table">
+            <a:tbl>
+              <a:tblPr/>
+              <a:tblGrid>
+                <a:gridCol w="1594080"/>
+                <a:gridCol w="2575440"/>
+                <a:gridCol w="2089800"/>
+                <a:gridCol w="2450520"/>
+              </a:tblGrid>
+              <a:tr h="598320">
+                <a:tc>
+                  <a:txBody>
+                    <a:bodyPr bIns="46800" lIns="90000" rIns="90000" tIns="46800" wrap="none"/>
+                    <a:p>
+                      <a:pPr algn="ctr"/>
+                      <a:r>
+                        <a:rPr lang="en-US"/>
+                        <a:t>Piece</a:t>
+                      </a:r>
+                      <a:endParaRPr/>
+                    </a:p>
+                  </a:txBody>
+                  <a:tcPr/>
+                </a:tc>
+                <a:tc>
+                  <a:txBody>
+                    <a:bodyPr bIns="46800" lIns="90000" rIns="90000" tIns="46800" wrap="none"/>
+                    <a:p>
+                      <a:pPr algn="ctr"/>
+                      <a:r>
+                        <a:rPr lang="en-US"/>
+                        <a:t>Move diff</a:t>
+                      </a:r>
+                      <a:endParaRPr/>
+                    </a:p>
+                  </a:txBody>
+                  <a:tcPr/>
+                </a:tc>
+                <a:tc>
+                  <a:txBody>
+                    <a:bodyPr bIns="46800" lIns="90000" rIns="90000" tIns="46800" wrap="none"/>
+                    <a:p>
+                      <a:pPr algn="ctr"/>
+                      <a:r>
+                        <a:rPr lang="en-US"/>
+                        <a:t>Relative location</a:t>
+                      </a:r>
+                      <a:endParaRPr/>
+                    </a:p>
+                  </a:txBody>
+                  <a:tcPr/>
+                </a:tc>
+                <a:tc>
+                  <a:txBody>
+                    <a:bodyPr bIns="46800" lIns="90000" rIns="90000" tIns="46800" wrap="none"/>
+                    <a:p>
+                      <a:pPr algn="ctr"/>
+                      <a:r>
+                        <a:rPr lang="en-US"/>
+                        <a:t>Content</a:t>
+                      </a:r>
+                      <a:endParaRPr/>
+                    </a:p>
+                  </a:txBody>
+                  <a:tcPr/>
+                </a:tc>
+              </a:tr>
+              <a:tr h="526320">
+                <a:tc>
+                  <a:txBody>
+                    <a:bodyPr bIns="46800" lIns="90000" rIns="90000" tIns="46800" wrap="none"/>
+                    <a:p>
+                      <a:pPr algn="ctr"/>
+                      <a:r>
+                        <a:rPr lang="en-US"/>
+                        <a:t>Knight</a:t>
+                      </a:r>
+                      <a:endParaRPr/>
+                    </a:p>
+                  </a:txBody>
+                  <a:tcPr/>
+                </a:tc>
+                <a:tc>
+                  <a:tcPr/>
+                </a:tc>
+                <a:tc>
+                  <a:tcPr/>
+                </a:tc>
+                <a:tc>
+                  <a:tcPr/>
+                </a:tc>
+              </a:tr>
+            </a:tbl>
+          </a:graphicData>
+        </a:graphic>
+      </p:graphicFrame>
+      <p:graphicFrame>
+        <p:nvGraphicFramePr>
+          <p:cNvPr id="174" name="Table 3"/>
+          <p:cNvGraphicFramePr/>
+          <p:nvPr/>
+        </p:nvGraphicFramePr>
+        <p:xfrm>
+          <a:off x="1791720" y="3831480"/>
+          <a:ext cx="5469840" cy="2496960"/>
+        </p:xfrm>
+        <a:graphic>
+          <a:graphicData uri="http://schemas.openxmlformats.org/drawingml/2006/table">
+            <a:tbl>
+              <a:tblPr/>
+              <a:tblGrid>
+                <a:gridCol w="1822680"/>
+                <a:gridCol w="1822680"/>
+                <a:gridCol w="1824480"/>
+              </a:tblGrid>
+              <a:tr h="832320">
+                <a:tc>
+                  <a:txBody>
+                    <a:bodyPr bIns="46800" lIns="90000" rIns="90000" tIns="46800" wrap="none"/>
+                    <a:p>
+                      <a:pPr algn="ctr"/>
+                      <a:r>
+                        <a:rPr lang="en-US"/>
+                        <a:t>0</a:t>
+                      </a:r>
+                      <a:endParaRPr/>
+                    </a:p>
+                  </a:txBody>
+                  <a:tcPr/>
+                </a:tc>
+                <a:tc>
+                  <a:txBody>
+                    <a:bodyPr bIns="46800" lIns="90000" rIns="90000" tIns="46800" wrap="none"/>
+                    <a:p>
+                      <a:pPr algn="ctr"/>
+                      <a:r>
+                        <a:rPr lang="en-US"/>
+                        <a:t>1</a:t>
+                      </a:r>
+                      <a:endParaRPr/>
+                    </a:p>
+                  </a:txBody>
+                  <a:tcPr/>
+                </a:tc>
+                <a:tc>
+                  <a:txBody>
+                    <a:bodyPr bIns="46800" lIns="90000" rIns="90000" tIns="46800" wrap="none"/>
+                    <a:p>
+                      <a:pPr algn="ctr"/>
+                      <a:r>
+                        <a:rPr lang="en-US"/>
+                        <a:t>2</a:t>
+                      </a:r>
+                      <a:endParaRPr/>
+                    </a:p>
+                  </a:txBody>
+                  <a:tcPr/>
+                </a:tc>
+              </a:tr>
+              <a:tr h="832320">
+                <a:tc>
+                  <a:txBody>
+                    <a:bodyPr bIns="46800" lIns="90000" rIns="90000" tIns="46800" wrap="none"/>
+                    <a:p>
+                      <a:pPr algn="ctr"/>
+                      <a:r>
+                        <a:rPr lang="en-US"/>
+                        <a:t>3</a:t>
+                      </a:r>
+                      <a:endParaRPr/>
+                    </a:p>
+                  </a:txBody>
+                  <a:tcPr/>
+                </a:tc>
+                <a:tc>
+                  <a:txBody>
+                    <a:bodyPr bIns="46800" lIns="90000" rIns="90000" tIns="46800" wrap="none"/>
+                    <a:p>
+                      <a:pPr algn="ctr"/>
+                      <a:r>
+                        <a:rPr lang="en-US"/>
+                        <a:t>N</a:t>
+                      </a:r>
+                      <a:endParaRPr/>
+                    </a:p>
+                  </a:txBody>
+                  <a:tcPr/>
+                </a:tc>
+                <a:tc>
+                  <a:txBody>
+                    <a:bodyPr bIns="46800" lIns="90000" rIns="90000" tIns="46800" wrap="none"/>
+                    <a:p>
+                      <a:pPr algn="ctr"/>
+                      <a:r>
+                        <a:rPr lang="en-US"/>
+                        <a:t>4</a:t>
+                      </a:r>
+                      <a:endParaRPr/>
+                    </a:p>
+                  </a:txBody>
+                  <a:tcPr/>
+                </a:tc>
+              </a:tr>
+              <a:tr h="832320">
+                <a:tc>
+                  <a:txBody>
+                    <a:bodyPr bIns="46800" lIns="90000" rIns="90000" tIns="46800" wrap="none"/>
+                    <a:p>
+                      <a:pPr algn="ctr"/>
+                      <a:r>
+                        <a:rPr lang="en-US"/>
+                        <a:t>6</a:t>
+                      </a:r>
+                      <a:endParaRPr/>
+                    </a:p>
+                  </a:txBody>
+                  <a:tcPr/>
+                </a:tc>
+                <a:tc>
+                  <a:txBody>
+                    <a:bodyPr bIns="46800" lIns="90000" rIns="90000" tIns="46800" wrap="none"/>
+                    <a:p>
+                      <a:pPr algn="ctr"/>
+                      <a:r>
+                        <a:rPr lang="en-US"/>
+                        <a:t>7</a:t>
+                      </a:r>
+                      <a:endParaRPr/>
+                    </a:p>
+                  </a:txBody>
+                  <a:tcPr/>
+                </a:tc>
+                <a:tc>
+                  <a:txBody>
+                    <a:bodyPr bIns="46800" lIns="90000" rIns="90000" tIns="46800" wrap="none"/>
+                    <a:p>
+                      <a:pPr algn="ctr"/>
+                      <a:r>
+                        <a:rPr lang="en-US"/>
+                        <a:t>8</a:t>
+                      </a:r>
+                      <a:endParaRPr/>
+                    </a:p>
+                  </a:txBody>
+                  <a:tcPr/>
+                </a:tc>
+              </a:tr>
+            </a:tbl>
+          </a:graphicData>
+        </a:graphic>
+      </p:graphicFrame>
+    </p:spTree>
+  </p:cSld>
+  <p:timing>
+    <p:tnLst>
+      <p:par>
+        <p:cTn dur="indefinite" id="37" nodeType="tmRoot" restart="never">
+          <p:childTnLst>
+            <p:seq>
+              <p:cTn id="38" nodeType="mainSeq">
+                <p:childTnLst/>
+              </p:cTn>
+              <p:prevCondLst>
+                <p:cond delay="0" evt="onPrev">
+                  <p:tgtEl>
+                    <p:sldTgt/>
+                  </p:tgtEl>
+                </p:cond>
+              </p:prevCondLst>
+              <p:nextCondLst>
+                <p:cond delay="0" evt="onNext">
+                  <p:tgtEl>
+                    <p:sldTgt/>
+                  </p:tgtEl>
+                </p:cond>
+              </p:nextCondLst>
+            </p:seq>
+          </p:childTnLst>
+        </p:cTn>
+      </p:par>
+    </p:tnLst>
+  </p:timing>
 </p:sld>
 </file>
 
@@ -5925,7 +7910,7 @@
         <p:spPr>
           <a:xfrm>
             <a:off x="457200" y="911520"/>
-            <a:ext cx="8228880" cy="1142280"/>
+            <a:ext cx="8228520" cy="1141920"/>
           </a:xfrm>
           <a:prstGeom prst="rect">
             <a:avLst/>
@@ -5961,7 +7946,7 @@
         <p:spPr>
           <a:xfrm>
             <a:off x="457200" y="2054520"/>
-            <a:ext cx="8228880" cy="3918240"/>
+            <a:ext cx="8228520" cy="3917880"/>
           </a:xfrm>
           <a:prstGeom prst="rect">
             <a:avLst/>
@@ -6132,6 +8117,836 @@
 </p:sld>
 </file>
 
+<file path=ppt/slides/slide20.xml><?xml version="1.0" encoding="utf-8"?>
+<p:sld xmlns:a="http://schemas.openxmlformats.org/drawingml/2006/main" xmlns:p="http://schemas.openxmlformats.org/presentationml/2006/main" xmlns:r="http://schemas.openxmlformats.org/officeDocument/2006/relationships">
+  <p:cSld>
+    <p:bg>
+      <p:bgPr>
+        <a:blipFill>
+          <a:blip r:embed="rId1"/>
+        </a:blipFill>
+      </p:bgPr>
+    </p:bg>
+    <p:spTree>
+      <p:nvGrpSpPr>
+        <p:cNvPr id="1" name=""/>
+        <p:cNvGrpSpPr/>
+        <p:nvPr/>
+      </p:nvGrpSpPr>
+      <p:grpSpPr>
+        <a:xfrm>
+          <a:off x="0" y="0"/>
+          <a:ext cx="0" cy="0"/>
+          <a:chOff x="0" y="0"/>
+          <a:chExt cx="0" cy="0"/>
+        </a:xfrm>
+      </p:grpSpPr>
+      <p:sp>
+        <p:nvSpPr>
+          <p:cNvPr id="175" name="CustomShape 1"/>
+          <p:cNvSpPr/>
+          <p:nvPr/>
+        </p:nvSpPr>
+        <p:spPr>
+          <a:xfrm>
+            <a:off x="1831680" y="427320"/>
+            <a:ext cx="7014960" cy="1141920"/>
+          </a:xfrm>
+          <a:prstGeom prst="rect">
+            <a:avLst/>
+          </a:prstGeom>
+        </p:spPr>
+        <p:txBody>
+          <a:bodyPr anchor="ctr" bIns="45000" lIns="90000" rIns="90000" tIns="45000"/>
+          <a:p>
+            <a:pPr>
+              <a:lnSpc>
+                <a:spcPct val="100000"/>
+              </a:lnSpc>
+            </a:pPr>
+            <a:r>
+              <a:rPr lang="en-US" sz="3600">
+                <a:solidFill>
+                  <a:srgbClr val="ffecbd"/>
+                </a:solidFill>
+                <a:latin typeface="Calibri"/>
+              </a:rPr>
+              <a:t>Learning checkmate</a:t>
+            </a:r>
+            <a:endParaRPr/>
+          </a:p>
+        </p:txBody>
+      </p:sp>
+      <p:sp>
+        <p:nvSpPr>
+          <p:cNvPr id="176" name="CustomShape 2"/>
+          <p:cNvSpPr/>
+          <p:nvPr/>
+        </p:nvSpPr>
+        <p:spPr>
+          <a:xfrm>
+            <a:off x="1831680" y="1596600"/>
+            <a:ext cx="7014960" cy="4274640"/>
+          </a:xfrm>
+          <a:prstGeom prst="rect">
+            <a:avLst/>
+          </a:prstGeom>
+        </p:spPr>
+        <p:txBody>
+          <a:bodyPr bIns="45000" lIns="90000" rIns="90000" tIns="45000"/>
+          <a:p>
+            <a:pPr>
+              <a:lnSpc>
+                <a:spcPct val="100000"/>
+              </a:lnSpc>
+              <a:buFont typeface="Arial"/>
+              <a:buChar char="•"/>
+            </a:pPr>
+            <a:r>
+              <a:rPr lang="en-US" sz="2800">
+                <a:solidFill>
+                  <a:srgbClr val="ffffff"/>
+                </a:solidFill>
+                <a:latin typeface="Calibri"/>
+              </a:rPr>
+              <a:t>Features:</a:t>
+            </a:r>
+            <a:endParaRPr/>
+          </a:p>
+          <a:p>
+            <a:pPr>
+              <a:lnSpc>
+                <a:spcPct val="100000"/>
+              </a:lnSpc>
+              <a:buFont typeface="Arial"/>
+              <a:buChar char="•"/>
+            </a:pPr>
+            <a:r>
+              <a:rPr lang="en-US" sz="2800">
+                <a:solidFill>
+                  <a:srgbClr val="ffffff"/>
+                </a:solidFill>
+                <a:latin typeface="Calibri"/>
+              </a:rPr>
+              <a:t>Number of pieces on the board</a:t>
+            </a:r>
+            <a:endParaRPr/>
+          </a:p>
+          <a:p>
+            <a:pPr>
+              <a:lnSpc>
+                <a:spcPct val="100000"/>
+              </a:lnSpc>
+              <a:buFont typeface="Arial"/>
+              <a:buChar char="•"/>
+            </a:pPr>
+            <a:r>
+              <a:rPr lang="en-US" sz="2800">
+                <a:solidFill>
+                  <a:srgbClr val="ffffff"/>
+                </a:solidFill>
+                <a:latin typeface="Calibri"/>
+              </a:rPr>
+              <a:t>Number of pieces in each party</a:t>
+            </a:r>
+            <a:endParaRPr/>
+          </a:p>
+          <a:p>
+            <a:pPr>
+              <a:lnSpc>
+                <a:spcPct val="100000"/>
+              </a:lnSpc>
+              <a:buFont typeface="Arial"/>
+              <a:buChar char="•"/>
+            </a:pPr>
+            <a:r>
+              <a:rPr lang="en-US" sz="2800">
+                <a:solidFill>
+                  <a:srgbClr val="ffffff"/>
+                </a:solidFill>
+                <a:latin typeface="Calibri"/>
+              </a:rPr>
+              <a:t>Number of pieces of each type</a:t>
+            </a:r>
+            <a:endParaRPr/>
+          </a:p>
+          <a:p>
+            <a:pPr>
+              <a:lnSpc>
+                <a:spcPct val="100000"/>
+              </a:lnSpc>
+              <a:buFont typeface="Arial"/>
+              <a:buChar char="•"/>
+            </a:pPr>
+            <a:r>
+              <a:rPr lang="en-US" sz="2800">
+                <a:solidFill>
+                  <a:srgbClr val="ffffff"/>
+                </a:solidFill>
+                <a:latin typeface="Calibri"/>
+              </a:rPr>
+              <a:t>Is Queen in the board</a:t>
+            </a:r>
+            <a:endParaRPr/>
+          </a:p>
+          <a:p>
+            <a:pPr>
+              <a:lnSpc>
+                <a:spcPct val="100000"/>
+              </a:lnSpc>
+              <a:buFont typeface="Arial"/>
+              <a:buChar char="•"/>
+            </a:pPr>
+            <a:r>
+              <a:rPr lang="en-US" sz="2800">
+                <a:solidFill>
+                  <a:srgbClr val="ffffff"/>
+                </a:solidFill>
+                <a:latin typeface="Calibri"/>
+              </a:rPr>
+              <a:t>Is King on the board</a:t>
+            </a:r>
+            <a:endParaRPr/>
+          </a:p>
+          <a:p>
+            <a:pPr>
+              <a:lnSpc>
+                <a:spcPct val="100000"/>
+              </a:lnSpc>
+              <a:buFont typeface="Arial"/>
+              <a:buChar char="•"/>
+            </a:pPr>
+            <a:r>
+              <a:rPr lang="en-US" sz="2800">
+                <a:solidFill>
+                  <a:srgbClr val="ffffff"/>
+                </a:solidFill>
+                <a:latin typeface="Calibri"/>
+              </a:rPr>
+              <a:t>Number of surrounding pieces by type and distance (1-3)</a:t>
+            </a:r>
+            <a:endParaRPr/>
+          </a:p>
+        </p:txBody>
+      </p:sp>
+    </p:spTree>
+  </p:cSld>
+  <p:timing>
+    <p:tnLst>
+      <p:par>
+        <p:cTn dur="indefinite" id="39" nodeType="tmRoot" restart="never">
+          <p:childTnLst>
+            <p:seq>
+              <p:cTn id="40" nodeType="mainSeq">
+                <p:childTnLst/>
+              </p:cTn>
+              <p:prevCondLst>
+                <p:cond delay="0" evt="onPrev">
+                  <p:tgtEl>
+                    <p:sldTgt/>
+                  </p:tgtEl>
+                </p:cond>
+              </p:prevCondLst>
+              <p:nextCondLst>
+                <p:cond delay="0" evt="onNext">
+                  <p:tgtEl>
+                    <p:sldTgt/>
+                  </p:tgtEl>
+                </p:cond>
+              </p:nextCondLst>
+            </p:seq>
+          </p:childTnLst>
+        </p:cTn>
+      </p:par>
+    </p:tnLst>
+  </p:timing>
+</p:sld>
+</file>
+
+<file path=ppt/slides/slide21.xml><?xml version="1.0" encoding="utf-8"?>
+<p:sld xmlns:a="http://schemas.openxmlformats.org/drawingml/2006/main" xmlns:p="http://schemas.openxmlformats.org/presentationml/2006/main" xmlns:r="http://schemas.openxmlformats.org/officeDocument/2006/relationships">
+  <p:cSld>
+    <p:bg>
+      <p:bgPr>
+        <a:blipFill>
+          <a:blip r:embed="rId1"/>
+        </a:blipFill>
+      </p:bgPr>
+    </p:bg>
+    <p:spTree>
+      <p:nvGrpSpPr>
+        <p:cNvPr id="1" name=""/>
+        <p:cNvGrpSpPr/>
+        <p:nvPr/>
+      </p:nvGrpSpPr>
+      <p:grpSpPr>
+        <a:xfrm>
+          <a:off x="0" y="0"/>
+          <a:ext cx="0" cy="0"/>
+          <a:chOff x="0" y="0"/>
+          <a:chExt cx="0" cy="0"/>
+        </a:xfrm>
+      </p:grpSpPr>
+      <p:sp>
+        <p:nvSpPr>
+          <p:cNvPr id="177" name="CustomShape 1"/>
+          <p:cNvSpPr/>
+          <p:nvPr/>
+        </p:nvSpPr>
+        <p:spPr>
+          <a:xfrm>
+            <a:off x="1831680" y="427320"/>
+            <a:ext cx="7014960" cy="1141920"/>
+          </a:xfrm>
+          <a:prstGeom prst="rect">
+            <a:avLst/>
+          </a:prstGeom>
+        </p:spPr>
+        <p:txBody>
+          <a:bodyPr anchor="ctr" bIns="45000" lIns="90000" rIns="90000" tIns="45000"/>
+          <a:p>
+            <a:pPr>
+              <a:lnSpc>
+                <a:spcPct val="100000"/>
+              </a:lnSpc>
+            </a:pPr>
+            <a:r>
+              <a:rPr lang="en-US" sz="3600">
+                <a:solidFill>
+                  <a:srgbClr val="ffecbd"/>
+                </a:solidFill>
+                <a:latin typeface="Calibri"/>
+              </a:rPr>
+              <a:t>Learning checkmate</a:t>
+            </a:r>
+            <a:endParaRPr/>
+          </a:p>
+        </p:txBody>
+      </p:sp>
+      <p:sp>
+        <p:nvSpPr>
+          <p:cNvPr id="178" name="CustomShape 2"/>
+          <p:cNvSpPr/>
+          <p:nvPr/>
+        </p:nvSpPr>
+        <p:spPr>
+          <a:xfrm>
+            <a:off x="1831680" y="1596600"/>
+            <a:ext cx="7014960" cy="4274640"/>
+          </a:xfrm>
+          <a:prstGeom prst="rect">
+            <a:avLst/>
+          </a:prstGeom>
+        </p:spPr>
+        <p:txBody>
+          <a:bodyPr bIns="45000" lIns="90000" rIns="90000" tIns="45000"/>
+          <a:p>
+            <a:pPr>
+              <a:lnSpc>
+                <a:spcPct val="100000"/>
+              </a:lnSpc>
+              <a:buFont typeface="Arial"/>
+              <a:buChar char="•"/>
+            </a:pPr>
+            <a:r>
+              <a:rPr lang="en-US" sz="2800">
+                <a:solidFill>
+                  <a:srgbClr val="ffffff"/>
+                </a:solidFill>
+                <a:latin typeface="Calibri"/>
+              </a:rPr>
+              <a:t>Features distribution (highlights):</a:t>
+            </a:r>
+            <a:endParaRPr/>
+          </a:p>
+          <a:p>
+            <a:pPr>
+              <a:lnSpc>
+                <a:spcPct val="100000"/>
+              </a:lnSpc>
+              <a:buFont typeface="Arial"/>
+              <a:buChar char="•"/>
+            </a:pPr>
+            <a:r>
+              <a:rPr lang="en-US" sz="2800">
+                <a:solidFill>
+                  <a:srgbClr val="ffffff"/>
+                </a:solidFill>
+                <a:latin typeface="Calibri"/>
+              </a:rPr>
+              <a:t>ddd</a:t>
+            </a:r>
+            <a:endParaRPr/>
+          </a:p>
+        </p:txBody>
+      </p:sp>
+    </p:spTree>
+  </p:cSld>
+  <p:timing>
+    <p:tnLst>
+      <p:par>
+        <p:cTn dur="indefinite" id="41" nodeType="tmRoot" restart="never">
+          <p:childTnLst>
+            <p:seq>
+              <p:cTn id="42" nodeType="mainSeq">
+                <p:childTnLst/>
+              </p:cTn>
+              <p:prevCondLst>
+                <p:cond delay="0" evt="onPrev">
+                  <p:tgtEl>
+                    <p:sldTgt/>
+                  </p:tgtEl>
+                </p:cond>
+              </p:prevCondLst>
+              <p:nextCondLst>
+                <p:cond delay="0" evt="onNext">
+                  <p:tgtEl>
+                    <p:sldTgt/>
+                  </p:tgtEl>
+                </p:cond>
+              </p:nextCondLst>
+            </p:seq>
+          </p:childTnLst>
+        </p:cTn>
+      </p:par>
+    </p:tnLst>
+  </p:timing>
+</p:sld>
+</file>
+
+<file path=ppt/slides/slide22.xml><?xml version="1.0" encoding="utf-8"?>
+<p:sld xmlns:a="http://schemas.openxmlformats.org/drawingml/2006/main" xmlns:p="http://schemas.openxmlformats.org/presentationml/2006/main" xmlns:r="http://schemas.openxmlformats.org/officeDocument/2006/relationships">
+  <p:cSld>
+    <p:bg>
+      <p:bgPr>
+        <a:blipFill>
+          <a:blip r:embed="rId1"/>
+        </a:blipFill>
+      </p:bgPr>
+    </p:bg>
+    <p:spTree>
+      <p:nvGrpSpPr>
+        <p:cNvPr id="1" name=""/>
+        <p:cNvGrpSpPr/>
+        <p:nvPr/>
+      </p:nvGrpSpPr>
+      <p:grpSpPr>
+        <a:xfrm>
+          <a:off x="0" y="0"/>
+          <a:ext cx="0" cy="0"/>
+          <a:chOff x="0" y="0"/>
+          <a:chExt cx="0" cy="0"/>
+        </a:xfrm>
+      </p:grpSpPr>
+      <p:sp>
+        <p:nvSpPr>
+          <p:cNvPr id="179" name="CustomShape 1"/>
+          <p:cNvSpPr/>
+          <p:nvPr/>
+        </p:nvSpPr>
+        <p:spPr>
+          <a:xfrm>
+            <a:off x="1831680" y="427320"/>
+            <a:ext cx="7014960" cy="1141920"/>
+          </a:xfrm>
+          <a:prstGeom prst="rect">
+            <a:avLst/>
+          </a:prstGeom>
+        </p:spPr>
+        <p:txBody>
+          <a:bodyPr anchor="ctr" bIns="45000" lIns="90000" rIns="90000" tIns="45000"/>
+          <a:p>
+            <a:pPr>
+              <a:lnSpc>
+                <a:spcPct val="100000"/>
+              </a:lnSpc>
+            </a:pPr>
+            <a:r>
+              <a:rPr lang="en-US" sz="3600">
+                <a:solidFill>
+                  <a:srgbClr val="ffecbd"/>
+                </a:solidFill>
+                <a:latin typeface="Calibri"/>
+              </a:rPr>
+              <a:t>Learning checkmate</a:t>
+            </a:r>
+            <a:endParaRPr/>
+          </a:p>
+        </p:txBody>
+      </p:sp>
+      <p:sp>
+        <p:nvSpPr>
+          <p:cNvPr id="180" name="CustomShape 2"/>
+          <p:cNvSpPr/>
+          <p:nvPr/>
+        </p:nvSpPr>
+        <p:spPr>
+          <a:xfrm>
+            <a:off x="1831680" y="1596600"/>
+            <a:ext cx="7014960" cy="4274640"/>
+          </a:xfrm>
+          <a:prstGeom prst="rect">
+            <a:avLst/>
+          </a:prstGeom>
+        </p:spPr>
+        <p:txBody>
+          <a:bodyPr bIns="45000" lIns="90000" rIns="90000" tIns="45000"/>
+          <a:p>
+            <a:pPr>
+              <a:lnSpc>
+                <a:spcPct val="100000"/>
+              </a:lnSpc>
+              <a:buFont typeface="Arial"/>
+              <a:buChar char="•"/>
+            </a:pPr>
+            <a:r>
+              <a:rPr lang="en-US" sz="2800">
+                <a:solidFill>
+                  <a:srgbClr val="ffffff"/>
+                </a:solidFill>
+                <a:latin typeface="Calibri"/>
+              </a:rPr>
+              <a:t>Results:</a:t>
+            </a:r>
+            <a:endParaRPr/>
+          </a:p>
+          <a:p>
+            <a:pPr>
+              <a:lnSpc>
+                <a:spcPct val="100000"/>
+              </a:lnSpc>
+              <a:buFont typeface="Arial"/>
+              <a:buChar char="•"/>
+            </a:pPr>
+            <a:r>
+              <a:rPr lang="en-US" sz="2800">
+                <a:solidFill>
+                  <a:srgbClr val="ffffff"/>
+                </a:solidFill>
+                <a:latin typeface="Calibri"/>
+              </a:rPr>
+              <a:t>90% ...</a:t>
+            </a:r>
+            <a:endParaRPr/>
+          </a:p>
+        </p:txBody>
+      </p:sp>
+    </p:spTree>
+  </p:cSld>
+  <p:timing>
+    <p:tnLst>
+      <p:par>
+        <p:cTn dur="indefinite" id="43" nodeType="tmRoot" restart="never">
+          <p:childTnLst>
+            <p:seq>
+              <p:cTn id="44" nodeType="mainSeq">
+                <p:childTnLst/>
+              </p:cTn>
+              <p:prevCondLst>
+                <p:cond delay="0" evt="onPrev">
+                  <p:tgtEl>
+                    <p:sldTgt/>
+                  </p:tgtEl>
+                </p:cond>
+              </p:prevCondLst>
+              <p:nextCondLst>
+                <p:cond delay="0" evt="onNext">
+                  <p:tgtEl>
+                    <p:sldTgt/>
+                  </p:tgtEl>
+                </p:cond>
+              </p:nextCondLst>
+            </p:seq>
+          </p:childTnLst>
+        </p:cTn>
+      </p:par>
+    </p:tnLst>
+  </p:timing>
+</p:sld>
+</file>
+
+<file path=ppt/slides/slide23.xml><?xml version="1.0" encoding="utf-8"?>
+<p:sld xmlns:a="http://schemas.openxmlformats.org/drawingml/2006/main" xmlns:p="http://schemas.openxmlformats.org/presentationml/2006/main" xmlns:r="http://schemas.openxmlformats.org/officeDocument/2006/relationships">
+  <p:cSld>
+    <p:spTree>
+      <p:nvGrpSpPr>
+        <p:cNvPr id="1" name=""/>
+        <p:cNvGrpSpPr/>
+        <p:nvPr/>
+      </p:nvGrpSpPr>
+      <p:grpSpPr>
+        <a:xfrm>
+          <a:off x="0" y="0"/>
+          <a:ext cx="0" cy="0"/>
+          <a:chOff x="0" y="0"/>
+          <a:chExt cx="0" cy="0"/>
+        </a:xfrm>
+      </p:grpSpPr>
+      <p:sp>
+        <p:nvSpPr>
+          <p:cNvPr id="181" name="CustomShape 1"/>
+          <p:cNvSpPr/>
+          <p:nvPr/>
+        </p:nvSpPr>
+        <p:spPr>
+          <a:xfrm>
+            <a:off x="448920" y="833040"/>
+            <a:ext cx="8228520" cy="1141920"/>
+          </a:xfrm>
+          <a:prstGeom prst="rect">
+            <a:avLst/>
+          </a:prstGeom>
+        </p:spPr>
+        <p:txBody>
+          <a:bodyPr anchor="ctr" bIns="45000" lIns="90000" rIns="90000" tIns="45000"/>
+          <a:p>
+            <a:pPr>
+              <a:lnSpc>
+                <a:spcPct val="100000"/>
+              </a:lnSpc>
+            </a:pPr>
+            <a:r>
+              <a:rPr lang="en-US" sz="3600">
+                <a:solidFill>
+                  <a:srgbClr val="ffecbd"/>
+                </a:solidFill>
+                <a:latin typeface="Calibri"/>
+              </a:rPr>
+              <a:t>Slide Title</a:t>
+            </a:r>
+            <a:endParaRPr/>
+          </a:p>
+        </p:txBody>
+      </p:sp>
+      <p:sp>
+        <p:nvSpPr>
+          <p:cNvPr id="182" name="CustomShape 2"/>
+          <p:cNvSpPr/>
+          <p:nvPr/>
+        </p:nvSpPr>
+        <p:spPr>
+          <a:xfrm>
+            <a:off x="448920" y="2002320"/>
+            <a:ext cx="4039200" cy="638640"/>
+          </a:xfrm>
+          <a:prstGeom prst="rect">
+            <a:avLst/>
+          </a:prstGeom>
+        </p:spPr>
+        <p:txBody>
+          <a:bodyPr anchor="b" bIns="45000" lIns="90000" rIns="90000" tIns="45000"/>
+          <a:p>
+            <a:pPr>
+              <a:lnSpc>
+                <a:spcPct val="100000"/>
+              </a:lnSpc>
+            </a:pPr>
+            <a:r>
+              <a:rPr b="1" lang="en-US" sz="2400">
+                <a:solidFill>
+                  <a:srgbClr val="ffffff"/>
+                </a:solidFill>
+                <a:latin typeface="Calibri"/>
+              </a:rPr>
+              <a:t>Product A</a:t>
+            </a:r>
+            <a:endParaRPr/>
+          </a:p>
+        </p:txBody>
+      </p:sp>
+      <p:sp>
+        <p:nvSpPr>
+          <p:cNvPr id="183" name="CustomShape 3"/>
+          <p:cNvSpPr/>
+          <p:nvPr/>
+        </p:nvSpPr>
+        <p:spPr>
+          <a:xfrm>
+            <a:off x="448920" y="2631960"/>
+            <a:ext cx="4039200" cy="3034080"/>
+          </a:xfrm>
+          <a:prstGeom prst="rect">
+            <a:avLst/>
+          </a:prstGeom>
+        </p:spPr>
+        <p:txBody>
+          <a:bodyPr anchor="ctr" bIns="45000" lIns="90000" rIns="90000" tIns="45000"/>
+          <a:p>
+            <a:pPr>
+              <a:lnSpc>
+                <a:spcPct val="100000"/>
+              </a:lnSpc>
+              <a:buFont typeface="Arial"/>
+              <a:buChar char="•"/>
+            </a:pPr>
+            <a:r>
+              <a:rPr lang="en-US" sz="2400">
+                <a:solidFill>
+                  <a:srgbClr val="ffffff"/>
+                </a:solidFill>
+                <a:latin typeface="Calibri"/>
+              </a:rPr>
+              <a:t>Feature 1</a:t>
+            </a:r>
+            <a:endParaRPr/>
+          </a:p>
+          <a:p>
+            <a:pPr>
+              <a:lnSpc>
+                <a:spcPct val="100000"/>
+              </a:lnSpc>
+              <a:buFont typeface="Arial"/>
+              <a:buChar char="•"/>
+            </a:pPr>
+            <a:r>
+              <a:rPr lang="en-US" sz="2400">
+                <a:solidFill>
+                  <a:srgbClr val="ffffff"/>
+                </a:solidFill>
+                <a:latin typeface="Calibri"/>
+              </a:rPr>
+              <a:t>Feature 2</a:t>
+            </a:r>
+            <a:endParaRPr/>
+          </a:p>
+          <a:p>
+            <a:pPr>
+              <a:lnSpc>
+                <a:spcPct val="100000"/>
+              </a:lnSpc>
+              <a:buFont typeface="Arial"/>
+              <a:buChar char="•"/>
+            </a:pPr>
+            <a:r>
+              <a:rPr lang="en-US" sz="2400">
+                <a:solidFill>
+                  <a:srgbClr val="ffffff"/>
+                </a:solidFill>
+                <a:latin typeface="Calibri"/>
+              </a:rPr>
+              <a:t>Feature 3</a:t>
+            </a:r>
+            <a:endParaRPr/>
+          </a:p>
+        </p:txBody>
+      </p:sp>
+      <p:sp>
+        <p:nvSpPr>
+          <p:cNvPr id="184" name="CustomShape 4"/>
+          <p:cNvSpPr/>
+          <p:nvPr/>
+        </p:nvSpPr>
+        <p:spPr>
+          <a:xfrm>
+            <a:off x="4636800" y="2002320"/>
+            <a:ext cx="4040640" cy="638640"/>
+          </a:xfrm>
+          <a:prstGeom prst="rect">
+            <a:avLst/>
+          </a:prstGeom>
+        </p:spPr>
+        <p:txBody>
+          <a:bodyPr anchor="b" bIns="45000" lIns="90000" rIns="90000" tIns="45000"/>
+          <a:p>
+            <a:pPr algn="ctr">
+              <a:lnSpc>
+                <a:spcPct val="100000"/>
+              </a:lnSpc>
+            </a:pPr>
+            <a:r>
+              <a:rPr b="1" lang="en-US" sz="2400">
+                <a:solidFill>
+                  <a:srgbClr val="ffffff"/>
+                </a:solidFill>
+                <a:latin typeface="Calibri"/>
+              </a:rPr>
+              <a:t>Product B</a:t>
+            </a:r>
+            <a:endParaRPr/>
+          </a:p>
+        </p:txBody>
+      </p:sp>
+      <p:sp>
+        <p:nvSpPr>
+          <p:cNvPr id="185" name="CustomShape 5"/>
+          <p:cNvSpPr/>
+          <p:nvPr/>
+        </p:nvSpPr>
+        <p:spPr>
+          <a:xfrm>
+            <a:off x="4636800" y="2631960"/>
+            <a:ext cx="4040640" cy="3034080"/>
+          </a:xfrm>
+          <a:prstGeom prst="rect">
+            <a:avLst/>
+          </a:prstGeom>
+        </p:spPr>
+        <p:txBody>
+          <a:bodyPr anchor="ctr" bIns="45000" lIns="90000" rIns="90000" tIns="45000"/>
+          <a:p>
+            <a:pPr algn="r">
+              <a:lnSpc>
+                <a:spcPct val="100000"/>
+              </a:lnSpc>
+              <a:buFont typeface="Arial"/>
+              <a:buChar char="•"/>
+            </a:pPr>
+            <a:r>
+              <a:rPr lang="en-US" sz="2400">
+                <a:solidFill>
+                  <a:srgbClr val="ffffff"/>
+                </a:solidFill>
+                <a:latin typeface="Calibri"/>
+              </a:rPr>
+              <a:t>Feature 1</a:t>
+            </a:r>
+            <a:endParaRPr/>
+          </a:p>
+          <a:p>
+            <a:pPr algn="r">
+              <a:lnSpc>
+                <a:spcPct val="100000"/>
+              </a:lnSpc>
+              <a:buFont typeface="Arial"/>
+              <a:buChar char="•"/>
+            </a:pPr>
+            <a:r>
+              <a:rPr lang="en-US" sz="2400">
+                <a:solidFill>
+                  <a:srgbClr val="ffffff"/>
+                </a:solidFill>
+                <a:latin typeface="Calibri"/>
+              </a:rPr>
+              <a:t>Feature 2</a:t>
+            </a:r>
+            <a:endParaRPr/>
+          </a:p>
+          <a:p>
+            <a:pPr algn="r">
+              <a:lnSpc>
+                <a:spcPct val="100000"/>
+              </a:lnSpc>
+              <a:buFont typeface="Arial"/>
+              <a:buChar char="•"/>
+            </a:pPr>
+            <a:r>
+              <a:rPr lang="en-US" sz="2400">
+                <a:solidFill>
+                  <a:srgbClr val="ffffff"/>
+                </a:solidFill>
+                <a:latin typeface="Calibri"/>
+              </a:rPr>
+              <a:t>Feature 3</a:t>
+            </a:r>
+            <a:endParaRPr/>
+          </a:p>
+        </p:txBody>
+      </p:sp>
+    </p:spTree>
+  </p:cSld>
+</p:sld>
+</file>
+
 <file path=ppt/slides/slide3.xml><?xml version="1.0" encoding="utf-8"?>
 <p:sld xmlns:a="http://schemas.openxmlformats.org/drawingml/2006/main" xmlns:p="http://schemas.openxmlformats.org/presentationml/2006/main" xmlns:r="http://schemas.openxmlformats.org/officeDocument/2006/relationships">
   <p:cSld>
@@ -6158,7 +8973,7 @@
         <p:spPr>
           <a:xfrm>
             <a:off x="457200" y="911520"/>
-            <a:ext cx="8228880" cy="1142280"/>
+            <a:ext cx="8228520" cy="1141920"/>
           </a:xfrm>
           <a:prstGeom prst="rect">
             <a:avLst/>
@@ -6194,7 +9009,7 @@
         <p:spPr>
           <a:xfrm>
             <a:off x="457200" y="2054520"/>
-            <a:ext cx="8228880" cy="3918240"/>
+            <a:ext cx="8228520" cy="3917880"/>
           </a:xfrm>
           <a:prstGeom prst="rect">
             <a:avLst/>
@@ -6253,7 +9068,7 @@
         <p:spPr>
           <a:xfrm>
             <a:off x="457560" y="2054880"/>
-            <a:ext cx="8228880" cy="3918240"/>
+            <a:ext cx="8228520" cy="3917880"/>
           </a:xfrm>
           <a:prstGeom prst="rect">
             <a:avLst/>
@@ -6423,7 +9238,7 @@
         <p:spPr>
           <a:xfrm>
             <a:off x="457200" y="911520"/>
-            <a:ext cx="8228880" cy="1142280"/>
+            <a:ext cx="8228520" cy="1141920"/>
           </a:xfrm>
           <a:prstGeom prst="rect">
             <a:avLst/>
@@ -6459,7 +9274,7 @@
         <p:spPr>
           <a:xfrm>
             <a:off x="457200" y="2054520"/>
-            <a:ext cx="8228880" cy="3918240"/>
+            <a:ext cx="8228520" cy="3917880"/>
           </a:xfrm>
           <a:prstGeom prst="rect">
             <a:avLst/>
@@ -6666,7 +9481,7 @@
         <p:spPr>
           <a:xfrm>
             <a:off x="457200" y="911520"/>
-            <a:ext cx="8228880" cy="1142280"/>
+            <a:ext cx="8228520" cy="1141920"/>
           </a:xfrm>
           <a:prstGeom prst="rect">
             <a:avLst/>
@@ -6702,7 +9517,7 @@
         <p:spPr>
           <a:xfrm>
             <a:off x="457200" y="2054520"/>
-            <a:ext cx="8228880" cy="3918240"/>
+            <a:ext cx="8228520" cy="3917880"/>
           </a:xfrm>
           <a:prstGeom prst="rect">
             <a:avLst/>
@@ -6773,6 +9588,35 @@
                 <a:latin typeface="Calibri"/>
               </a:rPr>
               <a:t> – Numpy, Scipy, Matplotlib</a:t>
+            </a:r>
+            <a:endParaRPr/>
+          </a:p>
+          <a:p>
+            <a:pPr>
+              <a:lnSpc>
+                <a:spcPct val="100000"/>
+              </a:lnSpc>
+              <a:buFont typeface="Arial"/>
+              <a:buChar char="•"/>
+            </a:pPr>
+            <a:endParaRPr/>
+          </a:p>
+          <a:p>
+            <a:pPr>
+              <a:lnSpc>
+                <a:spcPct val="100000"/>
+              </a:lnSpc>
+              <a:buFont typeface="Arial"/>
+              <a:buChar char="•"/>
+            </a:pPr>
+            <a:r>
+              <a:rPr lang="en-US" sz="2800">
+                <a:solidFill>
+                  <a:srgbClr val="ffffff"/>
+                </a:solidFill>
+                <a:latin typeface="Calibri"/>
+              </a:rPr>
+              <a:t>Used Map-Reduce architecture but the data is small enough to process all on single machine</a:t>
             </a:r>
             <a:endParaRPr/>
           </a:p>
@@ -6862,7 +9706,7 @@
         <p:spPr>
           <a:xfrm>
             <a:off x="457200" y="911520"/>
-            <a:ext cx="8228880" cy="1142280"/>
+            <a:ext cx="8228520" cy="1141920"/>
           </a:xfrm>
           <a:prstGeom prst="rect">
             <a:avLst/>
@@ -6898,7 +9742,7 @@
         <p:spPr>
           <a:xfrm>
             <a:off x="457200" y="2054520"/>
-            <a:ext cx="8228880" cy="3918240"/>
+            <a:ext cx="8228520" cy="3917880"/>
           </a:xfrm>
           <a:prstGeom prst="rect">
             <a:avLst/>
@@ -6957,8 +9801,6 @@
               <a:lnSpc>
                 <a:spcPct val="100000"/>
               </a:lnSpc>
-              <a:buFont typeface="Arial"/>
-              <a:buChar char="•"/>
             </a:pPr>
             <a:endParaRPr/>
           </a:p>
@@ -6986,8 +9828,6 @@
               <a:lnSpc>
                 <a:spcPct val="100000"/>
               </a:lnSpc>
-              <a:buFont typeface="Arial"/>
-              <a:buChar char="•"/>
             </a:pPr>
             <a:endParaRPr/>
           </a:p>
@@ -7069,7 +9909,7 @@
         <p:spPr>
           <a:xfrm>
             <a:off x="457200" y="911520"/>
-            <a:ext cx="8228880" cy="1142280"/>
+            <a:ext cx="8228520" cy="1141920"/>
           </a:xfrm>
           <a:prstGeom prst="rect">
             <a:avLst/>
@@ -7090,7 +9930,7 @@
                 </a:solidFill>
                 <a:latin typeface="Calibri"/>
               </a:rPr>
-              <a:t>Simple move 2.0</a:t>
+              <a:t>Simple move 1.0</a:t>
             </a:r>
             <a:endParaRPr/>
           </a:p>
@@ -7105,7 +9945,7 @@
         <p:spPr>
           <a:xfrm>
             <a:off x="457200" y="2054520"/>
-            <a:ext cx="8228880" cy="3918240"/>
+            <a:ext cx="8228520" cy="3917880"/>
           </a:xfrm>
           <a:prstGeom prst="rect">
             <a:avLst/>
@@ -7136,7 +9976,7 @@
                 </a:solidFill>
                 <a:latin typeface="Calibri"/>
               </a:rPr>
-              <a:t>Simple Move histogram for each piece type (TODO: add histograms)</a:t>
+              <a:t>For each move output move diff – x, y difference. </a:t>
             </a:r>
             <a:endParaRPr/>
           </a:p>
@@ -7274,104 +10114,28 @@
           <a:chExt cx="0" cy="0"/>
         </a:xfrm>
       </p:grpSpPr>
-      <p:sp>
-        <p:nvSpPr>
-          <p:cNvPr id="151" name="CustomShape 1"/>
-          <p:cNvSpPr/>
+      <p:pic>
+        <p:nvPicPr>
+          <p:cNvPr descr="" id="151" name=""/>
+          <p:cNvPicPr/>
           <p:nvPr/>
-        </p:nvSpPr>
-        <p:spPr>
-          <a:xfrm>
-            <a:off x="457200" y="911520"/>
-            <a:ext cx="8228880" cy="1142280"/>
-          </a:xfrm>
-          <a:prstGeom prst="rect">
-            <a:avLst/>
-          </a:prstGeom>
-        </p:spPr>
-        <p:txBody>
-          <a:bodyPr anchor="ctr" bIns="45000" lIns="90000" rIns="90000" tIns="45000"/>
-          <a:p>
-            <a:pPr>
-              <a:lnSpc>
-                <a:spcPct val="100000"/>
-              </a:lnSpc>
-            </a:pPr>
-            <a:r>
-              <a:rPr lang="en-US" sz="3600">
-                <a:solidFill>
-                  <a:srgbClr val="ffecbd"/>
-                </a:solidFill>
-                <a:latin typeface="Calibri"/>
-              </a:rPr>
-              <a:t>Simple move 2.0</a:t>
-            </a:r>
-            <a:endParaRPr/>
-          </a:p>
-        </p:txBody>
-      </p:sp>
-      <p:sp>
-        <p:nvSpPr>
-          <p:cNvPr id="152" name="CustomShape 2"/>
-          <p:cNvSpPr/>
-          <p:nvPr/>
-        </p:nvSpPr>
-        <p:spPr>
-          <a:xfrm>
-            <a:off x="457200" y="2054520"/>
-            <a:ext cx="8228880" cy="3918240"/>
-          </a:xfrm>
-          <a:prstGeom prst="rect">
-            <a:avLst/>
-          </a:prstGeom>
-        </p:spPr>
-        <p:txBody>
-          <a:bodyPr bIns="45000" lIns="90000" rIns="90000" tIns="45000"/>
-          <a:p>
-            <a:pPr>
-              <a:lnSpc>
-                <a:spcPct val="100000"/>
-              </a:lnSpc>
-            </a:pPr>
-            <a:endParaRPr/>
-          </a:p>
-          <a:p>
-            <a:pPr>
-              <a:lnSpc>
-                <a:spcPct val="100000"/>
-              </a:lnSpc>
-              <a:buFont typeface="Arial"/>
-              <a:buChar char="•"/>
-            </a:pPr>
-            <a:r>
-              <a:rPr lang="en-US" sz="2800">
-                <a:solidFill>
-                  <a:srgbClr val="ffffff"/>
-                </a:solidFill>
-                <a:latin typeface="Calibri"/>
-              </a:rPr>
-              <a:t>TODO – take a sample of 100k moves. For each piece move check all the moves saw in the histogram. Present results.</a:t>
-            </a:r>
-            <a:endParaRPr/>
-          </a:p>
-          <a:p>
-            <a:pPr>
-              <a:lnSpc>
-                <a:spcPct val="100000"/>
-              </a:lnSpc>
-            </a:pPr>
-            <a:endParaRPr/>
-          </a:p>
-          <a:p>
-            <a:pPr>
-              <a:lnSpc>
-                <a:spcPct val="100000"/>
-              </a:lnSpc>
-            </a:pPr>
-            <a:endParaRPr/>
-          </a:p>
-        </p:txBody>
-      </p:sp>
+        </p:nvPicPr>
+        <p:blipFill>
+          <a:blip r:embed="rId1"/>
+          <a:stretch>
+            <a:fillRect/>
+          </a:stretch>
+        </p:blipFill>
+        <p:spPr>
+          <a:xfrm>
+            <a:off x="879480" y="642600"/>
+            <a:ext cx="7424280" cy="5595480"/>
+          </a:xfrm>
+          <a:prstGeom prst="rect">
+            <a:avLst/>
+          </a:prstGeom>
+        </p:spPr>
+      </p:pic>
     </p:spTree>
   </p:cSld>
   <p:timing>
@@ -7409,13 +10173,6 @@
 <file path=ppt/slides/slide9.xml><?xml version="1.0" encoding="utf-8"?>
 <p:sld xmlns:a="http://schemas.openxmlformats.org/drawingml/2006/main" xmlns:p="http://schemas.openxmlformats.org/presentationml/2006/main" xmlns:r="http://schemas.openxmlformats.org/officeDocument/2006/relationships">
   <p:cSld>
-    <p:bg>
-      <p:bgPr>
-        <a:blipFill>
-          <a:blip r:embed="rId1"/>
-        </a:blipFill>
-      </p:bgPr>
-    </p:bg>
     <p:spTree>
       <p:nvGrpSpPr>
         <p:cNvPr id="1" name=""/>
@@ -7430,194 +10187,28 @@
           <a:chExt cx="0" cy="0"/>
         </a:xfrm>
       </p:grpSpPr>
-      <p:sp>
-        <p:nvSpPr>
-          <p:cNvPr id="153" name="CustomShape 1"/>
-          <p:cNvSpPr/>
+      <p:pic>
+        <p:nvPicPr>
+          <p:cNvPr descr="" id="152" name=""/>
+          <p:cNvPicPr/>
           <p:nvPr/>
-        </p:nvSpPr>
-        <p:spPr>
-          <a:xfrm>
-            <a:off x="1831680" y="427320"/>
-            <a:ext cx="7015320" cy="1142280"/>
-          </a:xfrm>
-          <a:prstGeom prst="rect">
-            <a:avLst/>
-          </a:prstGeom>
-        </p:spPr>
-        <p:txBody>
-          <a:bodyPr anchor="ctr" bIns="45000" lIns="90000" rIns="90000" tIns="45000"/>
-          <a:p>
-            <a:pPr>
-              <a:lnSpc>
-                <a:spcPct val="100000"/>
-              </a:lnSpc>
-            </a:pPr>
-            <a:r>
-              <a:rPr lang="en-US" sz="3600">
-                <a:solidFill>
-                  <a:srgbClr val="ffecbd"/>
-                </a:solidFill>
-                <a:latin typeface="Calibri"/>
-              </a:rPr>
-              <a:t>Learning checkmate</a:t>
-            </a:r>
-            <a:endParaRPr/>
-          </a:p>
-        </p:txBody>
-      </p:sp>
-      <p:sp>
-        <p:nvSpPr>
-          <p:cNvPr id="154" name="CustomShape 2"/>
-          <p:cNvSpPr/>
-          <p:nvPr/>
-        </p:nvSpPr>
-        <p:spPr>
-          <a:xfrm>
-            <a:off x="1831680" y="1596600"/>
-            <a:ext cx="7015320" cy="4275000"/>
-          </a:xfrm>
-          <a:prstGeom prst="rect">
-            <a:avLst/>
-          </a:prstGeom>
-        </p:spPr>
-        <p:txBody>
-          <a:bodyPr bIns="45000" lIns="90000" rIns="90000" tIns="45000"/>
-          <a:p>
-            <a:pPr>
-              <a:lnSpc>
-                <a:spcPct val="100000"/>
-              </a:lnSpc>
-              <a:buFont typeface="Arial"/>
-              <a:buChar char="•"/>
-            </a:pPr>
-            <a:r>
-              <a:rPr lang="en-US" sz="2800">
-                <a:solidFill>
-                  <a:srgbClr val="ffffff"/>
-                </a:solidFill>
-                <a:latin typeface="Calibri"/>
-              </a:rPr>
-              <a:t>Features:</a:t>
-            </a:r>
-            <a:endParaRPr/>
-          </a:p>
-          <a:p>
-            <a:pPr>
-              <a:lnSpc>
-                <a:spcPct val="100000"/>
-              </a:lnSpc>
-              <a:buFont typeface="Arial"/>
-              <a:buChar char="•"/>
-            </a:pPr>
-            <a:r>
-              <a:rPr lang="en-US" sz="2800">
-                <a:solidFill>
-                  <a:srgbClr val="ffffff"/>
-                </a:solidFill>
-                <a:latin typeface="Calibri"/>
-              </a:rPr>
-              <a:t>Number of pieces on the board</a:t>
-            </a:r>
-            <a:endParaRPr/>
-          </a:p>
-          <a:p>
-            <a:pPr>
-              <a:lnSpc>
-                <a:spcPct val="100000"/>
-              </a:lnSpc>
-              <a:buFont typeface="Arial"/>
-              <a:buChar char="•"/>
-            </a:pPr>
-            <a:r>
-              <a:rPr lang="en-US" sz="2800">
-                <a:solidFill>
-                  <a:srgbClr val="ffffff"/>
-                </a:solidFill>
-                <a:latin typeface="Calibri"/>
-              </a:rPr>
-              <a:t>Number of pieces in each party</a:t>
-            </a:r>
-            <a:endParaRPr/>
-          </a:p>
-          <a:p>
-            <a:pPr>
-              <a:lnSpc>
-                <a:spcPct val="100000"/>
-              </a:lnSpc>
-              <a:buFont typeface="Arial"/>
-              <a:buChar char="•"/>
-            </a:pPr>
-            <a:r>
-              <a:rPr lang="en-US" sz="2800">
-                <a:solidFill>
-                  <a:srgbClr val="ffffff"/>
-                </a:solidFill>
-                <a:latin typeface="Calibri"/>
-              </a:rPr>
-              <a:t>Number of pieces of each type</a:t>
-            </a:r>
-            <a:endParaRPr/>
-          </a:p>
-          <a:p>
-            <a:pPr>
-              <a:lnSpc>
-                <a:spcPct val="100000"/>
-              </a:lnSpc>
-              <a:buFont typeface="Arial"/>
-              <a:buChar char="•"/>
-            </a:pPr>
-            <a:r>
-              <a:rPr lang="en-US" sz="2800">
-                <a:solidFill>
-                  <a:srgbClr val="ffffff"/>
-                </a:solidFill>
-                <a:latin typeface="Calibri"/>
-              </a:rPr>
-              <a:t>Is Queen in the board</a:t>
-            </a:r>
-            <a:endParaRPr/>
-          </a:p>
-          <a:p>
-            <a:pPr>
-              <a:lnSpc>
-                <a:spcPct val="100000"/>
-              </a:lnSpc>
-              <a:buFont typeface="Arial"/>
-              <a:buChar char="•"/>
-            </a:pPr>
-            <a:r>
-              <a:rPr lang="en-US" sz="2800">
-                <a:solidFill>
-                  <a:srgbClr val="ffffff"/>
-                </a:solidFill>
-                <a:latin typeface="Calibri"/>
-              </a:rPr>
-              <a:t>Is King on the board</a:t>
-            </a:r>
-            <a:endParaRPr/>
-          </a:p>
-          <a:p>
-            <a:pPr>
-              <a:lnSpc>
-                <a:spcPct val="100000"/>
-              </a:lnSpc>
-              <a:buFont typeface="Arial"/>
-              <a:buChar char="•"/>
-            </a:pPr>
-            <a:r>
-              <a:rPr lang="en-US" sz="2800">
-                <a:solidFill>
-                  <a:srgbClr val="ffffff"/>
-                </a:solidFill>
-                <a:latin typeface="Calibri"/>
-              </a:rPr>
-              <a:t>Number of surrounding pieces by type and distance (1-3)</a:t>
-            </a:r>
-            <a:endParaRPr/>
-          </a:p>
-        </p:txBody>
-      </p:sp>
+        </p:nvPicPr>
+        <p:blipFill>
+          <a:blip r:embed="rId1"/>
+          <a:stretch>
+            <a:fillRect/>
+          </a:stretch>
+        </p:blipFill>
+        <p:spPr>
+          <a:xfrm>
+            <a:off x="822960" y="805320"/>
+            <a:ext cx="7424280" cy="5595480"/>
+          </a:xfrm>
+          <a:prstGeom prst="rect">
+            <a:avLst/>
+          </a:prstGeom>
+        </p:spPr>
+      </p:pic>
     </p:spTree>
   </p:cSld>
   <p:timing>

</xml_diff>